<commit_message>
First commit todo list project
</commit_message>
<xml_diff>
--- a/material/ReactAula1.pptx
+++ b/material/ReactAula1.pptx
@@ -19,8 +19,13 @@
     <p:sldId id="279" r:id="rId13"/>
     <p:sldId id="280" r:id="rId14"/>
     <p:sldId id="281" r:id="rId15"/>
-    <p:sldId id="264" r:id="rId16"/>
-    <p:sldId id="272" r:id="rId17"/>
+    <p:sldId id="282" r:id="rId16"/>
+    <p:sldId id="283" r:id="rId17"/>
+    <p:sldId id="284" r:id="rId18"/>
+    <p:sldId id="285" r:id="rId19"/>
+    <p:sldId id="286" r:id="rId20"/>
+    <p:sldId id="264" r:id="rId21"/>
+    <p:sldId id="272" r:id="rId22"/>
   </p:sldIdLst>
   <p:sldSz cx="12192000" cy="6858000"/>
   <p:notesSz cx="6858000" cy="9144000"/>
@@ -274,7 +279,7 @@
           <a:p>
             <a:fld id="{F173C421-78E7-4F2F-AA80-2269C56115F5}" type="datetimeFigureOut">
               <a:rPr lang="pt-BR" smtClean="0"/>
-              <a:t>23/01/2019</a:t>
+              <a:t>25/01/2019</a:t>
             </a:fld>
             <a:endParaRPr lang="pt-BR"/>
           </a:p>
@@ -472,7 +477,7 @@
           <a:p>
             <a:fld id="{F173C421-78E7-4F2F-AA80-2269C56115F5}" type="datetimeFigureOut">
               <a:rPr lang="pt-BR" smtClean="0"/>
-              <a:t>23/01/2019</a:t>
+              <a:t>25/01/2019</a:t>
             </a:fld>
             <a:endParaRPr lang="pt-BR"/>
           </a:p>
@@ -680,7 +685,7 @@
           <a:p>
             <a:fld id="{F173C421-78E7-4F2F-AA80-2269C56115F5}" type="datetimeFigureOut">
               <a:rPr lang="pt-BR" smtClean="0"/>
-              <a:t>23/01/2019</a:t>
+              <a:t>25/01/2019</a:t>
             </a:fld>
             <a:endParaRPr lang="pt-BR"/>
           </a:p>
@@ -878,7 +883,7 @@
           <a:p>
             <a:fld id="{F173C421-78E7-4F2F-AA80-2269C56115F5}" type="datetimeFigureOut">
               <a:rPr lang="pt-BR" smtClean="0"/>
-              <a:t>23/01/2019</a:t>
+              <a:t>25/01/2019</a:t>
             </a:fld>
             <a:endParaRPr lang="pt-BR"/>
           </a:p>
@@ -1153,7 +1158,7 @@
           <a:p>
             <a:fld id="{F173C421-78E7-4F2F-AA80-2269C56115F5}" type="datetimeFigureOut">
               <a:rPr lang="pt-BR" smtClean="0"/>
-              <a:t>23/01/2019</a:t>
+              <a:t>25/01/2019</a:t>
             </a:fld>
             <a:endParaRPr lang="pt-BR"/>
           </a:p>
@@ -1418,7 +1423,7 @@
           <a:p>
             <a:fld id="{F173C421-78E7-4F2F-AA80-2269C56115F5}" type="datetimeFigureOut">
               <a:rPr lang="pt-BR" smtClean="0"/>
-              <a:t>23/01/2019</a:t>
+              <a:t>25/01/2019</a:t>
             </a:fld>
             <a:endParaRPr lang="pt-BR"/>
           </a:p>
@@ -1830,7 +1835,7 @@
           <a:p>
             <a:fld id="{F173C421-78E7-4F2F-AA80-2269C56115F5}" type="datetimeFigureOut">
               <a:rPr lang="pt-BR" smtClean="0"/>
-              <a:t>23/01/2019</a:t>
+              <a:t>25/01/2019</a:t>
             </a:fld>
             <a:endParaRPr lang="pt-BR"/>
           </a:p>
@@ -1971,7 +1976,7 @@
           <a:p>
             <a:fld id="{F173C421-78E7-4F2F-AA80-2269C56115F5}" type="datetimeFigureOut">
               <a:rPr lang="pt-BR" smtClean="0"/>
-              <a:t>23/01/2019</a:t>
+              <a:t>25/01/2019</a:t>
             </a:fld>
             <a:endParaRPr lang="pt-BR"/>
           </a:p>
@@ -2084,7 +2089,7 @@
           <a:p>
             <a:fld id="{F173C421-78E7-4F2F-AA80-2269C56115F5}" type="datetimeFigureOut">
               <a:rPr lang="pt-BR" smtClean="0"/>
-              <a:t>23/01/2019</a:t>
+              <a:t>25/01/2019</a:t>
             </a:fld>
             <a:endParaRPr lang="pt-BR"/>
           </a:p>
@@ -2395,7 +2400,7 @@
           <a:p>
             <a:fld id="{F173C421-78E7-4F2F-AA80-2269C56115F5}" type="datetimeFigureOut">
               <a:rPr lang="pt-BR" smtClean="0"/>
-              <a:t>23/01/2019</a:t>
+              <a:t>25/01/2019</a:t>
             </a:fld>
             <a:endParaRPr lang="pt-BR"/>
           </a:p>
@@ -2683,7 +2688,7 @@
           <a:p>
             <a:fld id="{F173C421-78E7-4F2F-AA80-2269C56115F5}" type="datetimeFigureOut">
               <a:rPr lang="pt-BR" smtClean="0"/>
-              <a:t>23/01/2019</a:t>
+              <a:t>25/01/2019</a:t>
             </a:fld>
             <a:endParaRPr lang="pt-BR"/>
           </a:p>
@@ -2924,7 +2929,7 @@
           <a:p>
             <a:fld id="{F173C421-78E7-4F2F-AA80-2269C56115F5}" type="datetimeFigureOut">
               <a:rPr lang="pt-BR" smtClean="0"/>
-              <a:t>23/01/2019</a:t>
+              <a:t>25/01/2019</a:t>
             </a:fld>
             <a:endParaRPr lang="pt-BR"/>
           </a:p>
@@ -5454,7 +5459,7 @@
               <a:t>A diferença entre os dois é que </a:t>
             </a:r>
             <a:r>
-              <a:rPr lang="pt-BR" i="1" dirty="0" err="1">
+              <a:rPr lang="pt-BR" b="1" i="1" dirty="0" err="1">
                 <a:latin typeface="Arial" panose="020B0604020202020204" pitchFamily="34" charset="0"/>
                 <a:cs typeface="Arial" panose="020B0604020202020204" pitchFamily="34" charset="0"/>
               </a:rPr>
@@ -5482,7 +5487,7 @@
               <a:t>, enquanto </a:t>
             </a:r>
             <a:r>
-              <a:rPr lang="pt-BR" i="1" dirty="0" err="1">
+              <a:rPr lang="pt-BR" b="1" i="1" dirty="0" err="1">
                 <a:latin typeface="Arial" panose="020B0604020202020204" pitchFamily="34" charset="0"/>
                 <a:cs typeface="Arial" panose="020B0604020202020204" pitchFamily="34" charset="0"/>
               </a:rPr>
@@ -5508,6 +5513,33 @@
                 <a:cs typeface="Arial" panose="020B0604020202020204" pitchFamily="34" charset="0"/>
               </a:rPr>
               <a:t>.</a:t>
+            </a:r>
+          </a:p>
+          <a:p>
+            <a:pPr>
+              <a:buFont typeface="Wingdings" panose="05000000000000000000" pitchFamily="2" charset="2"/>
+              <a:buChar char="Ø"/>
+            </a:pPr>
+            <a:r>
+              <a:rPr lang="pt-BR" dirty="0">
+                <a:latin typeface="Arial" panose="020B0604020202020204" pitchFamily="34" charset="0"/>
+                <a:cs typeface="Arial" panose="020B0604020202020204" pitchFamily="34" charset="0"/>
+              </a:rPr>
+              <a:t>O </a:t>
+            </a:r>
+            <a:r>
+              <a:rPr lang="pt-BR" dirty="0" err="1">
+                <a:latin typeface="Arial" panose="020B0604020202020204" pitchFamily="34" charset="0"/>
+                <a:cs typeface="Arial" panose="020B0604020202020204" pitchFamily="34" charset="0"/>
+              </a:rPr>
+              <a:t>state</a:t>
+            </a:r>
+            <a:r>
+              <a:rPr lang="pt-BR" dirty="0">
+                <a:latin typeface="Arial" panose="020B0604020202020204" pitchFamily="34" charset="0"/>
+                <a:cs typeface="Arial" panose="020B0604020202020204" pitchFamily="34" charset="0"/>
+              </a:rPr>
+              <a:t> pode ser qualquer conjunto de informações que serão utilizadas em algum momento pela interface.</a:t>
             </a:r>
           </a:p>
         </p:txBody>
@@ -5781,6 +5813,109 @@
                       </p:childTnLst>
                     </p:cTn>
                   </p:par>
+                  <p:par>
+                    <p:cTn id="9" fill="hold">
+                      <p:stCondLst>
+                        <p:cond delay="indefinite"/>
+                      </p:stCondLst>
+                      <p:childTnLst>
+                        <p:par>
+                          <p:cTn id="10" fill="hold">
+                            <p:stCondLst>
+                              <p:cond delay="0"/>
+                            </p:stCondLst>
+                            <p:childTnLst>
+                              <p:par>
+                                <p:cTn id="11" presetID="2" presetClass="entr" presetSubtype="4" fill="hold" nodeType="clickEffect">
+                                  <p:stCondLst>
+                                    <p:cond delay="0"/>
+                                  </p:stCondLst>
+                                  <p:childTnLst>
+                                    <p:set>
+                                      <p:cBhvr>
+                                        <p:cTn id="12" dur="1" fill="hold">
+                                          <p:stCondLst>
+                                            <p:cond delay="0"/>
+                                          </p:stCondLst>
+                                        </p:cTn>
+                                        <p:tgtEl>
+                                          <p:spTgt spid="3">
+                                            <p:txEl>
+                                              <p:pRg st="1" end="1"/>
+                                            </p:txEl>
+                                          </p:spTgt>
+                                        </p:tgtEl>
+                                        <p:attrNameLst>
+                                          <p:attrName>style.visibility</p:attrName>
+                                        </p:attrNameLst>
+                                      </p:cBhvr>
+                                      <p:to>
+                                        <p:strVal val="visible"/>
+                                      </p:to>
+                                    </p:set>
+                                    <p:anim calcmode="lin" valueType="num">
+                                      <p:cBhvr additive="base">
+                                        <p:cTn id="13" dur="500" fill="hold"/>
+                                        <p:tgtEl>
+                                          <p:spTgt spid="3">
+                                            <p:txEl>
+                                              <p:pRg st="1" end="1"/>
+                                            </p:txEl>
+                                          </p:spTgt>
+                                        </p:tgtEl>
+                                        <p:attrNameLst>
+                                          <p:attrName>ppt_x</p:attrName>
+                                        </p:attrNameLst>
+                                      </p:cBhvr>
+                                      <p:tavLst>
+                                        <p:tav tm="0">
+                                          <p:val>
+                                            <p:strVal val="#ppt_x"/>
+                                          </p:val>
+                                        </p:tav>
+                                        <p:tav tm="100000">
+                                          <p:val>
+                                            <p:strVal val="#ppt_x"/>
+                                          </p:val>
+                                        </p:tav>
+                                      </p:tavLst>
+                                    </p:anim>
+                                    <p:anim calcmode="lin" valueType="num">
+                                      <p:cBhvr additive="base">
+                                        <p:cTn id="14" dur="500" fill="hold"/>
+                                        <p:tgtEl>
+                                          <p:spTgt spid="3">
+                                            <p:txEl>
+                                              <p:pRg st="1" end="1"/>
+                                            </p:txEl>
+                                          </p:spTgt>
+                                        </p:tgtEl>
+                                        <p:attrNameLst>
+                                          <p:attrName>ppt_y</p:attrName>
+                                        </p:attrNameLst>
+                                      </p:cBhvr>
+                                      <p:tavLst>
+                                        <p:tav tm="0">
+                                          <p:val>
+                                            <p:strVal val="1+#ppt_h/2"/>
+                                          </p:val>
+                                        </p:tav>
+                                        <p:tav tm="100000">
+                                          <p:val>
+                                            <p:strVal val="#ppt_y"/>
+                                          </p:val>
+                                        </p:tav>
+                                      </p:tavLst>
+                                    </p:anim>
+                                  </p:childTnLst>
+                                </p:cTn>
+                              </p:par>
+                            </p:childTnLst>
+                          </p:cTn>
+                        </p:par>
+                      </p:childTnLst>
+                    </p:cTn>
+                  </p:par>
                 </p:childTnLst>
               </p:cTn>
               <p:prevCondLst>
@@ -6198,328 +6333,7 @@
           <p:cNvPr id="3" name="Espaço Reservado para Conteúdo 2">
             <a:extLst>
               <a:ext uri="{FF2B5EF4-FFF2-40B4-BE49-F238E27FC236}">
-                <a16:creationId xmlns:a16="http://schemas.microsoft.com/office/drawing/2014/main" id="{1AAB47FC-6C28-4E71-B466-6E4AC797B104}"/>
-              </a:ext>
-            </a:extLst>
-          </p:cNvPr>
-          <p:cNvSpPr>
-            <a:spLocks noGrp="1"/>
-          </p:cNvSpPr>
-          <p:nvPr>
-            <p:ph idx="1"/>
-          </p:nvPr>
-        </p:nvSpPr>
-        <p:spPr>
-          <a:xfrm>
-            <a:off x="838200" y="1825625"/>
-            <a:ext cx="10515600" cy="4956916"/>
-          </a:xfrm>
-        </p:spPr>
-        <p:txBody>
-          <a:bodyPr>
-            <a:normAutofit/>
-          </a:bodyPr>
-          <a:lstStyle/>
-          <a:p>
-            <a:pPr marL="1371600" lvl="3" indent="0">
-              <a:buNone/>
-            </a:pPr>
-            <a:r>
-              <a:rPr lang="pt-BR" sz="2800" dirty="0">
-                <a:latin typeface="Arial" panose="020B0604020202020204" pitchFamily="34" charset="0"/>
-                <a:cs typeface="Arial" panose="020B0604020202020204" pitchFamily="34" charset="0"/>
-              </a:rPr>
-              <a:t>Visual Studio </a:t>
-            </a:r>
-            <a:r>
-              <a:rPr lang="pt-BR" sz="2800" dirty="0" err="1">
-                <a:latin typeface="Arial" panose="020B0604020202020204" pitchFamily="34" charset="0"/>
-                <a:cs typeface="Arial" panose="020B0604020202020204" pitchFamily="34" charset="0"/>
-              </a:rPr>
-              <a:t>Code</a:t>
-            </a:r>
-            <a:endParaRPr lang="pt-BR" sz="2800" dirty="0">
-              <a:latin typeface="Arial" panose="020B0604020202020204" pitchFamily="34" charset="0"/>
-              <a:cs typeface="Arial" panose="020B0604020202020204" pitchFamily="34" charset="0"/>
-            </a:endParaRPr>
-          </a:p>
-          <a:p>
-            <a:pPr lvl="3"/>
-            <a:r>
-              <a:rPr lang="pt-BR" sz="2800" dirty="0">
-                <a:latin typeface="Arial" panose="020B0604020202020204" pitchFamily="34" charset="0"/>
-                <a:cs typeface="Arial" panose="020B0604020202020204" pitchFamily="34" charset="0"/>
-                <a:hlinkClick r:id="rId2"/>
-              </a:rPr>
-              <a:t>https://code.visualstudio.com/</a:t>
-            </a:r>
-            <a:endParaRPr lang="pt-BR" sz="2800" dirty="0">
-              <a:latin typeface="Arial" panose="020B0604020202020204" pitchFamily="34" charset="0"/>
-              <a:cs typeface="Arial" panose="020B0604020202020204" pitchFamily="34" charset="0"/>
-            </a:endParaRPr>
-          </a:p>
-          <a:p>
-            <a:pPr lvl="2"/>
-            <a:endParaRPr lang="pt-BR" sz="2800" dirty="0">
-              <a:latin typeface="Arial" panose="020B0604020202020204" pitchFamily="34" charset="0"/>
-              <a:cs typeface="Arial" panose="020B0604020202020204" pitchFamily="34" charset="0"/>
-            </a:endParaRPr>
-          </a:p>
-          <a:p>
-            <a:pPr marL="1371600" lvl="3" indent="0">
-              <a:buNone/>
-            </a:pPr>
-            <a:r>
-              <a:rPr lang="pt-BR" sz="2800" dirty="0">
-                <a:latin typeface="Arial" panose="020B0604020202020204" pitchFamily="34" charset="0"/>
-                <a:cs typeface="Arial" panose="020B0604020202020204" pitchFamily="34" charset="0"/>
-              </a:rPr>
-              <a:t>Node  v8.x</a:t>
-            </a:r>
-          </a:p>
-          <a:p>
-            <a:pPr lvl="3"/>
-            <a:r>
-              <a:rPr lang="pt-BR" sz="2800" dirty="0">
-                <a:latin typeface="Arial" panose="020B0604020202020204" pitchFamily="34" charset="0"/>
-                <a:cs typeface="Arial" panose="020B0604020202020204" pitchFamily="34" charset="0"/>
-                <a:hlinkClick r:id="rId3"/>
-              </a:rPr>
-              <a:t>https://nodejs.org/en/</a:t>
-            </a:r>
-            <a:endParaRPr lang="pt-BR" dirty="0"/>
-          </a:p>
-        </p:txBody>
-      </p:sp>
-      <p:pic>
-        <p:nvPicPr>
-          <p:cNvPr id="5" name="Imagem 4">
-            <a:extLst>
-              <a:ext uri="{FF2B5EF4-FFF2-40B4-BE49-F238E27FC236}">
-                <a16:creationId xmlns:a16="http://schemas.microsoft.com/office/drawing/2014/main" id="{1980853C-3337-45DD-B93F-291A0DC92A1A}"/>
-              </a:ext>
-            </a:extLst>
-          </p:cNvPr>
-          <p:cNvPicPr>
-            <a:picLocks noChangeAspect="1"/>
-          </p:cNvPicPr>
-          <p:nvPr/>
-        </p:nvPicPr>
-        <p:blipFill>
-          <a:blip r:embed="rId4">
-            <a:extLst>
-              <a:ext uri="{28A0092B-C50C-407E-A947-70E740481C1C}">
-                <a14:useLocalDpi xmlns:a14="http://schemas.microsoft.com/office/drawing/2010/main" val="0"/>
-              </a:ext>
-            </a:extLst>
-          </a:blip>
-          <a:stretch>
-            <a:fillRect/>
-          </a:stretch>
-        </p:blipFill>
-        <p:spPr>
-          <a:xfrm>
-            <a:off x="1089081" y="1810489"/>
-            <a:ext cx="836420" cy="833283"/>
-          </a:xfrm>
-          <a:prstGeom prst="rect">
-            <a:avLst/>
-          </a:prstGeom>
-        </p:spPr>
-      </p:pic>
-      <p:pic>
-        <p:nvPicPr>
-          <p:cNvPr id="7" name="Imagem 6">
-            <a:extLst>
-              <a:ext uri="{FF2B5EF4-FFF2-40B4-BE49-F238E27FC236}">
-                <a16:creationId xmlns:a16="http://schemas.microsoft.com/office/drawing/2014/main" id="{2D6F34DB-D420-435C-9272-D07FFA6883AC}"/>
-              </a:ext>
-            </a:extLst>
-          </p:cNvPr>
-          <p:cNvPicPr>
-            <a:picLocks noChangeAspect="1"/>
-          </p:cNvPicPr>
-          <p:nvPr/>
-        </p:nvPicPr>
-        <p:blipFill>
-          <a:blip r:embed="rId5">
-            <a:extLst>
-              <a:ext uri="{28A0092B-C50C-407E-A947-70E740481C1C}">
-                <a14:useLocalDpi xmlns:a14="http://schemas.microsoft.com/office/drawing/2010/main" val="0"/>
-              </a:ext>
-            </a:extLst>
-          </a:blip>
-          <a:stretch>
-            <a:fillRect/>
-          </a:stretch>
-        </p:blipFill>
-        <p:spPr>
-          <a:xfrm>
-            <a:off x="838200" y="3185592"/>
-            <a:ext cx="1092237" cy="669091"/>
-          </a:xfrm>
-          <a:prstGeom prst="rect">
-            <a:avLst/>
-          </a:prstGeom>
-        </p:spPr>
-      </p:pic>
-      <p:sp>
-        <p:nvSpPr>
-          <p:cNvPr id="8" name="Título 1">
-            <a:extLst>
-              <a:ext uri="{FF2B5EF4-FFF2-40B4-BE49-F238E27FC236}">
-                <a16:creationId xmlns:a16="http://schemas.microsoft.com/office/drawing/2014/main" id="{B3BEFC02-D129-4D1F-BF87-57E82425225E}"/>
-              </a:ext>
-            </a:extLst>
-          </p:cNvPr>
-          <p:cNvSpPr txBox="1">
-            <a:spLocks/>
-          </p:cNvSpPr>
-          <p:nvPr/>
-        </p:nvSpPr>
-        <p:spPr>
-          <a:xfrm>
-            <a:off x="-97654" y="122968"/>
-            <a:ext cx="12289654" cy="854430"/>
-          </a:xfrm>
-          <a:prstGeom prst="rect">
-            <a:avLst/>
-          </a:prstGeom>
-        </p:spPr>
-        <p:txBody>
-          <a:bodyPr vert="horz" lIns="91440" tIns="45720" rIns="91440" bIns="45720" rtlCol="0" anchor="ctr">
-            <a:noAutofit/>
-          </a:bodyPr>
-          <a:lstStyle>
-            <a:lvl1pPr algn="l" defTabSz="914400" rtl="0" eaLnBrk="1" latinLnBrk="0" hangingPunct="1">
-              <a:lnSpc>
-                <a:spcPct val="90000"/>
-              </a:lnSpc>
-              <a:spcBef>
-                <a:spcPct val="0"/>
-              </a:spcBef>
-              <a:buNone/>
-              <a:defRPr sz="4400" kern="1200">
-                <a:solidFill>
-                  <a:schemeClr val="tx1"/>
-                </a:solidFill>
-                <a:latin typeface="+mj-lt"/>
-                <a:ea typeface="+mj-ea"/>
-                <a:cs typeface="+mj-cs"/>
-              </a:defRPr>
-            </a:lvl1pPr>
-          </a:lstStyle>
-          <a:p>
-            <a:pPr algn="ctr"/>
-            <a:r>
-              <a:rPr lang="pt-BR" sz="5400" b="1" dirty="0">
-                <a:solidFill>
-                  <a:srgbClr val="F46524"/>
-                </a:solidFill>
-                <a:latin typeface="Arial" panose="020B0604020202020204" pitchFamily="34" charset="0"/>
-                <a:cs typeface="Arial" panose="020B0604020202020204" pitchFamily="34" charset="0"/>
-              </a:rPr>
-              <a:t>Ferramentas de trabalho</a:t>
-            </a:r>
-          </a:p>
-        </p:txBody>
-      </p:sp>
-      <p:pic>
-        <p:nvPicPr>
-          <p:cNvPr id="10" name="Imagem 9">
-            <a:extLst>
-              <a:ext uri="{FF2B5EF4-FFF2-40B4-BE49-F238E27FC236}">
-                <a16:creationId xmlns:a16="http://schemas.microsoft.com/office/drawing/2014/main" id="{84D279C7-1C06-4004-9991-A13A3190FD61}"/>
-              </a:ext>
-            </a:extLst>
-          </p:cNvPr>
-          <p:cNvPicPr>
-            <a:picLocks noChangeAspect="1"/>
-          </p:cNvPicPr>
-          <p:nvPr/>
-        </p:nvPicPr>
-        <p:blipFill>
-          <a:blip r:embed="rId6"/>
-          <a:stretch>
-            <a:fillRect/>
-          </a:stretch>
-        </p:blipFill>
-        <p:spPr>
-          <a:xfrm>
-            <a:off x="10258887" y="122968"/>
-            <a:ext cx="1447800" cy="790575"/>
-          </a:xfrm>
-          <a:prstGeom prst="rect">
-            <a:avLst/>
-          </a:prstGeom>
-        </p:spPr>
-      </p:pic>
-      <p:pic>
-        <p:nvPicPr>
-          <p:cNvPr id="11" name="Imagem 10">
-            <a:extLst>
-              <a:ext uri="{FF2B5EF4-FFF2-40B4-BE49-F238E27FC236}">
-                <a16:creationId xmlns:a16="http://schemas.microsoft.com/office/drawing/2014/main" id="{F0A6D002-2C9E-4769-993E-9B276F082CBC}"/>
-              </a:ext>
-            </a:extLst>
-          </p:cNvPr>
-          <p:cNvPicPr>
-            <a:picLocks noChangeAspect="1"/>
-          </p:cNvPicPr>
-          <p:nvPr/>
-        </p:nvPicPr>
-        <p:blipFill>
-          <a:blip r:embed="rId7"/>
-          <a:stretch>
-            <a:fillRect/>
-          </a:stretch>
-        </p:blipFill>
-        <p:spPr>
-          <a:xfrm>
-            <a:off x="0" y="0"/>
-            <a:ext cx="1419225" cy="1495425"/>
-          </a:xfrm>
-          <a:prstGeom prst="rect">
-            <a:avLst/>
-          </a:prstGeom>
-        </p:spPr>
-      </p:pic>
-    </p:spTree>
-    <p:extLst>
-      <p:ext uri="{BB962C8B-B14F-4D97-AF65-F5344CB8AC3E}">
-        <p14:creationId xmlns:p14="http://schemas.microsoft.com/office/powerpoint/2010/main" val="46393853"/>
-      </p:ext>
-    </p:extLst>
-  </p:cSld>
-  <p:clrMapOvr>
-    <a:masterClrMapping/>
-  </p:clrMapOvr>
-</p:sld>
-</file>
-
-<file path=ppt/slides/slide16.xml><?xml version="1.0" encoding="utf-8"?>
-<p:sld xmlns:a="http://schemas.openxmlformats.org/drawingml/2006/main" xmlns:r="http://schemas.openxmlformats.org/officeDocument/2006/relationships" xmlns:p="http://schemas.openxmlformats.org/presentationml/2006/main">
-  <p:cSld>
-    <p:spTree>
-      <p:nvGrpSpPr>
-        <p:cNvPr id="1" name=""/>
-        <p:cNvGrpSpPr/>
-        <p:nvPr/>
-      </p:nvGrpSpPr>
-      <p:grpSpPr>
-        <a:xfrm>
-          <a:off x="0" y="0"/>
-          <a:ext cx="0" cy="0"/>
-          <a:chOff x="0" y="0"/>
-          <a:chExt cx="0" cy="0"/>
-        </a:xfrm>
-      </p:grpSpPr>
-      <p:sp>
-        <p:nvSpPr>
-          <p:cNvPr id="3" name="Espaço Reservado para Conteúdo 2">
-            <a:extLst>
-              <a:ext uri="{FF2B5EF4-FFF2-40B4-BE49-F238E27FC236}">
-                <a16:creationId xmlns:a16="http://schemas.microsoft.com/office/drawing/2014/main" id="{E314484E-A931-4CA1-9026-C6C88FF7498E}"/>
+                <a16:creationId xmlns:a16="http://schemas.microsoft.com/office/drawing/2014/main" id="{1C54187F-8492-4796-96CD-9E4382E87C6F}"/>
               </a:ext>
             </a:extLst>
           </p:cNvPr>
@@ -6532,88 +6346,31 @@
         </p:nvSpPr>
         <p:spPr/>
         <p:txBody>
-          <a:bodyPr/>
+          <a:bodyPr>
+            <a:normAutofit/>
+          </a:bodyPr>
           <a:lstStyle/>
           <a:p>
-            <a:pPr>
+            <a:pPr algn="just">
               <a:buFont typeface="Wingdings" panose="05000000000000000000" pitchFamily="2" charset="2"/>
-              <a:buChar char="ü"/>
+              <a:buChar char="Ø"/>
             </a:pPr>
             <a:r>
               <a:rPr lang="pt-BR" dirty="0">
                 <a:latin typeface="Arial" panose="020B0604020202020204" pitchFamily="34" charset="0"/>
                 <a:cs typeface="Arial" panose="020B0604020202020204" pitchFamily="34" charset="0"/>
               </a:rPr>
-              <a:t>https://reactjs.org/</a:t>
-            </a:r>
-          </a:p>
-          <a:p>
-            <a:pPr>
-              <a:buFont typeface="Wingdings" panose="05000000000000000000" pitchFamily="2" charset="2"/>
-              <a:buChar char="ü"/>
-            </a:pPr>
-            <a:r>
-              <a:rPr lang="pt-BR" dirty="0">
-                <a:latin typeface="Arial" panose="020B0604020202020204" pitchFamily="34" charset="0"/>
-                <a:cs typeface="Arial" panose="020B0604020202020204" pitchFamily="34" charset="0"/>
-                <a:hlinkClick r:id="rId2"/>
-              </a:rPr>
-              <a:t>https://medium.com/by-vinicius-reis/o-que-e-react-ng2-auleria-vue-e34b0c77b5a1</a:t>
-            </a:r>
-            <a:endParaRPr lang="pt-BR" dirty="0">
-              <a:latin typeface="Arial" panose="020B0604020202020204" pitchFamily="34" charset="0"/>
-              <a:cs typeface="Arial" panose="020B0604020202020204" pitchFamily="34" charset="0"/>
-            </a:endParaRPr>
-          </a:p>
-          <a:p>
-            <a:pPr>
-              <a:buFont typeface="Wingdings" panose="05000000000000000000" pitchFamily="2" charset="2"/>
-              <a:buChar char="ü"/>
-            </a:pPr>
-            <a:r>
-              <a:rPr lang="pt-BR" dirty="0">
-                <a:latin typeface="Arial" panose="020B0604020202020204" pitchFamily="34" charset="0"/>
-                <a:cs typeface="Arial" panose="020B0604020202020204" pitchFamily="34" charset="0"/>
-                <a:hlinkClick r:id="rId3"/>
-              </a:rPr>
-              <a:t>https://gabrielsobrinho.com/introducao-ao-react-js/</a:t>
-            </a:r>
-            <a:endParaRPr lang="pt-BR" dirty="0">
-              <a:latin typeface="Arial" panose="020B0604020202020204" pitchFamily="34" charset="0"/>
-              <a:cs typeface="Arial" panose="020B0604020202020204" pitchFamily="34" charset="0"/>
-            </a:endParaRPr>
-          </a:p>
-          <a:p>
-            <a:pPr>
-              <a:buFont typeface="Wingdings" panose="05000000000000000000" pitchFamily="2" charset="2"/>
-              <a:buChar char="ü"/>
-            </a:pPr>
-            <a:r>
-              <a:rPr lang="pt-BR" dirty="0">
-                <a:latin typeface="Arial" panose="020B0604020202020204" pitchFamily="34" charset="0"/>
-                <a:cs typeface="Arial" panose="020B0604020202020204" pitchFamily="34" charset="0"/>
-              </a:rPr>
-              <a:t>https://medium.com/reactbrasil/jsx-de6f43b06f41</a:t>
-            </a:r>
-          </a:p>
-          <a:p>
-            <a:pPr>
-              <a:buFont typeface="Wingdings" panose="05000000000000000000" pitchFamily="2" charset="2"/>
-              <a:buChar char="ü"/>
-            </a:pPr>
-            <a:endParaRPr lang="pt-BR" dirty="0">
-              <a:latin typeface="Arial" panose="020B0604020202020204" pitchFamily="34" charset="0"/>
-              <a:cs typeface="Arial" panose="020B0604020202020204" pitchFamily="34" charset="0"/>
-            </a:endParaRPr>
+              <a:t>São os ciclos de vida que um componente tem.</a:t>
+            </a:r>
           </a:p>
         </p:txBody>
       </p:sp>
       <p:sp>
         <p:nvSpPr>
-          <p:cNvPr id="4" name="Título 1">
-            <a:extLst>
-              <a:ext uri="{FF2B5EF4-FFF2-40B4-BE49-F238E27FC236}">
-                <a16:creationId xmlns:a16="http://schemas.microsoft.com/office/drawing/2014/main" id="{34934F35-0906-4549-9909-B329B73EDBCA}"/>
+          <p:cNvPr id="6" name="Título 1">
+            <a:extLst>
+              <a:ext uri="{FF2B5EF4-FFF2-40B4-BE49-F238E27FC236}">
+                <a16:creationId xmlns:a16="http://schemas.microsoft.com/office/drawing/2014/main" id="{62E1AAE0-A067-4119-BE22-1FE8351FD147}"/>
               </a:ext>
             </a:extLst>
           </p:cNvPr>
@@ -6657,24 +6414,61 @@
           <a:p>
             <a:pPr algn="ctr"/>
             <a:r>
-              <a:rPr lang="pt-BR" sz="5400" b="1" dirty="0">
+              <a:rPr lang="pt-BR" sz="4800" b="1" dirty="0">
                 <a:solidFill>
                   <a:srgbClr val="F46524"/>
                 </a:solidFill>
                 <a:latin typeface="Arial" panose="020B0604020202020204" pitchFamily="34" charset="0"/>
                 <a:cs typeface="Arial" panose="020B0604020202020204" pitchFamily="34" charset="0"/>
               </a:rPr>
-              <a:t>Referências	</a:t>
-            </a:r>
+              <a:t>The </a:t>
+            </a:r>
+            <a:r>
+              <a:rPr lang="pt-BR" sz="4800" b="1" dirty="0" err="1">
+                <a:solidFill>
+                  <a:srgbClr val="F46524"/>
+                </a:solidFill>
+                <a:latin typeface="Arial" panose="020B0604020202020204" pitchFamily="34" charset="0"/>
+                <a:cs typeface="Arial" panose="020B0604020202020204" pitchFamily="34" charset="0"/>
+              </a:rPr>
+              <a:t>Component</a:t>
+            </a:r>
+            <a:r>
+              <a:rPr lang="pt-BR" sz="4800" b="1" dirty="0">
+                <a:solidFill>
+                  <a:srgbClr val="F46524"/>
+                </a:solidFill>
+                <a:latin typeface="Arial" panose="020B0604020202020204" pitchFamily="34" charset="0"/>
+                <a:cs typeface="Arial" panose="020B0604020202020204" pitchFamily="34" charset="0"/>
+              </a:rPr>
+              <a:t> </a:t>
+            </a:r>
+            <a:r>
+              <a:rPr lang="pt-BR" sz="4800" b="1" dirty="0" err="1">
+                <a:solidFill>
+                  <a:srgbClr val="F46524"/>
+                </a:solidFill>
+                <a:latin typeface="Arial" panose="020B0604020202020204" pitchFamily="34" charset="0"/>
+                <a:cs typeface="Arial" panose="020B0604020202020204" pitchFamily="34" charset="0"/>
+              </a:rPr>
+              <a:t>Lifecycle</a:t>
+            </a:r>
+            <a:endParaRPr lang="pt-BR" sz="4800" b="1" dirty="0">
+              <a:solidFill>
+                <a:srgbClr val="F46524"/>
+              </a:solidFill>
+              <a:latin typeface="Arial" panose="020B0604020202020204" pitchFamily="34" charset="0"/>
+              <a:cs typeface="Arial" panose="020B0604020202020204" pitchFamily="34" charset="0"/>
+            </a:endParaRPr>
           </a:p>
         </p:txBody>
       </p:sp>
       <p:pic>
         <p:nvPicPr>
-          <p:cNvPr id="5" name="Imagem 4">
-            <a:extLst>
-              <a:ext uri="{FF2B5EF4-FFF2-40B4-BE49-F238E27FC236}">
-                <a16:creationId xmlns:a16="http://schemas.microsoft.com/office/drawing/2014/main" id="{BD34B949-7911-4817-A780-4FD0E7942C08}"/>
+          <p:cNvPr id="7" name="Imagem 6">
+            <a:extLst>
+              <a:ext uri="{FF2B5EF4-FFF2-40B4-BE49-F238E27FC236}">
+                <a16:creationId xmlns:a16="http://schemas.microsoft.com/office/drawing/2014/main" id="{4E6DF7A4-AA0F-4323-8CC2-D016FEA6DF7B}"/>
               </a:ext>
             </a:extLst>
           </p:cNvPr>
@@ -6684,7 +6478,7 @@
           <p:nvPr/>
         </p:nvPicPr>
         <p:blipFill>
-          <a:blip r:embed="rId4"/>
+          <a:blip r:embed="rId2"/>
           <a:stretch>
             <a:fillRect/>
           </a:stretch>
@@ -6701,10 +6495,10 @@
       </p:pic>
       <p:pic>
         <p:nvPicPr>
-          <p:cNvPr id="6" name="Imagem 5">
-            <a:extLst>
-              <a:ext uri="{FF2B5EF4-FFF2-40B4-BE49-F238E27FC236}">
-                <a16:creationId xmlns:a16="http://schemas.microsoft.com/office/drawing/2014/main" id="{AB37113D-8A5A-44BA-947B-C158178085B8}"/>
+          <p:cNvPr id="8" name="Imagem 7">
+            <a:extLst>
+              <a:ext uri="{FF2B5EF4-FFF2-40B4-BE49-F238E27FC236}">
+                <a16:creationId xmlns:a16="http://schemas.microsoft.com/office/drawing/2014/main" id="{4A328260-2ADB-4693-9112-53AB287FD66C}"/>
               </a:ext>
             </a:extLst>
           </p:cNvPr>
@@ -6714,7 +6508,7 @@
           <p:nvPr/>
         </p:nvPicPr>
         <p:blipFill>
-          <a:blip r:embed="rId5"/>
+          <a:blip r:embed="rId3"/>
           <a:stretch>
             <a:fillRect/>
           </a:stretch>
@@ -6732,13 +6526,2207 @@
     </p:spTree>
     <p:extLst>
       <p:ext uri="{BB962C8B-B14F-4D97-AF65-F5344CB8AC3E}">
-        <p14:creationId xmlns:p14="http://schemas.microsoft.com/office/powerpoint/2010/main" val="2847445711"/>
+        <p14:creationId xmlns:p14="http://schemas.microsoft.com/office/powerpoint/2010/main" val="4104118620"/>
       </p:ext>
     </p:extLst>
   </p:cSld>
   <p:clrMapOvr>
     <a:masterClrMapping/>
   </p:clrMapOvr>
+  <p:timing>
+    <p:tnLst>
+      <p:par>
+        <p:cTn id="1" dur="indefinite" restart="never" nodeType="tmRoot">
+          <p:childTnLst>
+            <p:seq concurrent="1" nextAc="seek">
+              <p:cTn id="2" dur="indefinite" nodeType="mainSeq">
+                <p:childTnLst>
+                  <p:par>
+                    <p:cTn id="3" fill="hold">
+                      <p:stCondLst>
+                        <p:cond delay="indefinite"/>
+                      </p:stCondLst>
+                      <p:childTnLst>
+                        <p:par>
+                          <p:cTn id="4" fill="hold">
+                            <p:stCondLst>
+                              <p:cond delay="0"/>
+                            </p:stCondLst>
+                            <p:childTnLst>
+                              <p:par>
+                                <p:cTn id="5" presetID="2" presetClass="entr" presetSubtype="4" fill="hold" nodeType="clickEffect">
+                                  <p:stCondLst>
+                                    <p:cond delay="0"/>
+                                  </p:stCondLst>
+                                  <p:childTnLst>
+                                    <p:set>
+                                      <p:cBhvr>
+                                        <p:cTn id="6" dur="1" fill="hold">
+                                          <p:stCondLst>
+                                            <p:cond delay="0"/>
+                                          </p:stCondLst>
+                                        </p:cTn>
+                                        <p:tgtEl>
+                                          <p:spTgt spid="3">
+                                            <p:txEl>
+                                              <p:pRg st="0" end="0"/>
+                                            </p:txEl>
+                                          </p:spTgt>
+                                        </p:tgtEl>
+                                        <p:attrNameLst>
+                                          <p:attrName>style.visibility</p:attrName>
+                                        </p:attrNameLst>
+                                      </p:cBhvr>
+                                      <p:to>
+                                        <p:strVal val="visible"/>
+                                      </p:to>
+                                    </p:set>
+                                    <p:anim calcmode="lin" valueType="num">
+                                      <p:cBhvr additive="base">
+                                        <p:cTn id="7" dur="500" fill="hold"/>
+                                        <p:tgtEl>
+                                          <p:spTgt spid="3">
+                                            <p:txEl>
+                                              <p:pRg st="0" end="0"/>
+                                            </p:txEl>
+                                          </p:spTgt>
+                                        </p:tgtEl>
+                                        <p:attrNameLst>
+                                          <p:attrName>ppt_x</p:attrName>
+                                        </p:attrNameLst>
+                                      </p:cBhvr>
+                                      <p:tavLst>
+                                        <p:tav tm="0">
+                                          <p:val>
+                                            <p:strVal val="#ppt_x"/>
+                                          </p:val>
+                                        </p:tav>
+                                        <p:tav tm="100000">
+                                          <p:val>
+                                            <p:strVal val="#ppt_x"/>
+                                          </p:val>
+                                        </p:tav>
+                                      </p:tavLst>
+                                    </p:anim>
+                                    <p:anim calcmode="lin" valueType="num">
+                                      <p:cBhvr additive="base">
+                                        <p:cTn id="8" dur="500" fill="hold"/>
+                                        <p:tgtEl>
+                                          <p:spTgt spid="3">
+                                            <p:txEl>
+                                              <p:pRg st="0" end="0"/>
+                                            </p:txEl>
+                                          </p:spTgt>
+                                        </p:tgtEl>
+                                        <p:attrNameLst>
+                                          <p:attrName>ppt_y</p:attrName>
+                                        </p:attrNameLst>
+                                      </p:cBhvr>
+                                      <p:tavLst>
+                                        <p:tav tm="0">
+                                          <p:val>
+                                            <p:strVal val="1+#ppt_h/2"/>
+                                          </p:val>
+                                        </p:tav>
+                                        <p:tav tm="100000">
+                                          <p:val>
+                                            <p:strVal val="#ppt_y"/>
+                                          </p:val>
+                                        </p:tav>
+                                      </p:tavLst>
+                                    </p:anim>
+                                  </p:childTnLst>
+                                </p:cTn>
+                              </p:par>
+                            </p:childTnLst>
+                          </p:cTn>
+                        </p:par>
+                      </p:childTnLst>
+                    </p:cTn>
+                  </p:par>
+                </p:childTnLst>
+              </p:cTn>
+              <p:prevCondLst>
+                <p:cond evt="onPrev" delay="0">
+                  <p:tgtEl>
+                    <p:sldTgt/>
+                  </p:tgtEl>
+                </p:cond>
+              </p:prevCondLst>
+              <p:nextCondLst>
+                <p:cond evt="onNext" delay="0">
+                  <p:tgtEl>
+                    <p:sldTgt/>
+                  </p:tgtEl>
+                </p:cond>
+              </p:nextCondLst>
+            </p:seq>
+          </p:childTnLst>
+        </p:cTn>
+      </p:par>
+    </p:tnLst>
+  </p:timing>
+</p:sld>
+</file>
+
+<file path=ppt/slides/slide16.xml><?xml version="1.0" encoding="utf-8"?>
+<p:sld xmlns:a="http://schemas.openxmlformats.org/drawingml/2006/main" xmlns:r="http://schemas.openxmlformats.org/officeDocument/2006/relationships" xmlns:p="http://schemas.openxmlformats.org/presentationml/2006/main">
+  <p:cSld>
+    <p:spTree>
+      <p:nvGrpSpPr>
+        <p:cNvPr id="1" name=""/>
+        <p:cNvGrpSpPr/>
+        <p:nvPr/>
+      </p:nvGrpSpPr>
+      <p:grpSpPr>
+        <a:xfrm>
+          <a:off x="0" y="0"/>
+          <a:ext cx="0" cy="0"/>
+          <a:chOff x="0" y="0"/>
+          <a:chExt cx="0" cy="0"/>
+        </a:xfrm>
+      </p:grpSpPr>
+      <p:sp>
+        <p:nvSpPr>
+          <p:cNvPr id="3" name="Espaço Reservado para Conteúdo 2">
+            <a:extLst>
+              <a:ext uri="{FF2B5EF4-FFF2-40B4-BE49-F238E27FC236}">
+                <a16:creationId xmlns:a16="http://schemas.microsoft.com/office/drawing/2014/main" id="{1C54187F-8492-4796-96CD-9E4382E87C6F}"/>
+              </a:ext>
+            </a:extLst>
+          </p:cNvPr>
+          <p:cNvSpPr>
+            <a:spLocks noGrp="1"/>
+          </p:cNvSpPr>
+          <p:nvPr>
+            <p:ph idx="1"/>
+          </p:nvPr>
+        </p:nvSpPr>
+        <p:spPr/>
+        <p:txBody>
+          <a:bodyPr>
+            <a:normAutofit/>
+          </a:bodyPr>
+          <a:lstStyle/>
+          <a:p>
+            <a:pPr algn="just">
+              <a:buFont typeface="Wingdings" panose="05000000000000000000" pitchFamily="2" charset="2"/>
+              <a:buChar char="Ø"/>
+            </a:pPr>
+            <a:r>
+              <a:rPr lang="pt-BR" dirty="0">
+                <a:latin typeface="Arial" panose="020B0604020202020204" pitchFamily="34" charset="0"/>
+                <a:cs typeface="Arial" panose="020B0604020202020204" pitchFamily="34" charset="0"/>
+              </a:rPr>
+              <a:t>Criação</a:t>
+            </a:r>
+          </a:p>
+          <a:p>
+            <a:pPr lvl="1" algn="just"/>
+            <a:r>
+              <a:rPr lang="pt-BR" dirty="0" err="1">
+                <a:latin typeface="Arial" panose="020B0604020202020204" pitchFamily="34" charset="0"/>
+                <a:cs typeface="Arial" panose="020B0604020202020204" pitchFamily="34" charset="0"/>
+              </a:rPr>
+              <a:t>Constructor</a:t>
+            </a:r>
+            <a:r>
+              <a:rPr lang="pt-BR" dirty="0">
+                <a:latin typeface="Arial" panose="020B0604020202020204" pitchFamily="34" charset="0"/>
+                <a:cs typeface="Arial" panose="020B0604020202020204" pitchFamily="34" charset="0"/>
+              </a:rPr>
+              <a:t> - </a:t>
+            </a:r>
+            <a:r>
+              <a:rPr lang="pt-BR" dirty="0"/>
+              <a:t>Esse é o método construtor do nosso componente, executado logo quando o componente é instanciado. Normalmente, esse método é utilizado para inicializarmos valores dentro e também quando precisamos fazer </a:t>
+            </a:r>
+            <a:r>
+              <a:rPr lang="pt-BR" dirty="0" err="1">
+                <a:hlinkClick r:id="rId2"/>
+              </a:rPr>
+              <a:t>bind</a:t>
+            </a:r>
+            <a:r>
+              <a:rPr lang="pt-BR" dirty="0">
+                <a:hlinkClick r:id="rId2"/>
+              </a:rPr>
+              <a:t> dos métodos</a:t>
+            </a:r>
+            <a:r>
+              <a:rPr lang="pt-BR" dirty="0"/>
+              <a:t> da nossa classe</a:t>
+            </a:r>
+            <a:endParaRPr lang="pt-BR" dirty="0">
+              <a:latin typeface="Arial" panose="020B0604020202020204" pitchFamily="34" charset="0"/>
+              <a:cs typeface="Arial" panose="020B0604020202020204" pitchFamily="34" charset="0"/>
+            </a:endParaRPr>
+          </a:p>
+        </p:txBody>
+      </p:sp>
+      <p:sp>
+        <p:nvSpPr>
+          <p:cNvPr id="6" name="Título 1">
+            <a:extLst>
+              <a:ext uri="{FF2B5EF4-FFF2-40B4-BE49-F238E27FC236}">
+                <a16:creationId xmlns:a16="http://schemas.microsoft.com/office/drawing/2014/main" id="{62E1AAE0-A067-4119-BE22-1FE8351FD147}"/>
+              </a:ext>
+            </a:extLst>
+          </p:cNvPr>
+          <p:cNvSpPr txBox="1">
+            <a:spLocks/>
+          </p:cNvSpPr>
+          <p:nvPr/>
+        </p:nvSpPr>
+        <p:spPr>
+          <a:xfrm>
+            <a:off x="0" y="122968"/>
+            <a:ext cx="12192000" cy="854430"/>
+          </a:xfrm>
+          <a:prstGeom prst="rect">
+            <a:avLst/>
+          </a:prstGeom>
+        </p:spPr>
+        <p:txBody>
+          <a:bodyPr vert="horz" lIns="91440" tIns="45720" rIns="91440" bIns="45720" rtlCol="0" anchor="ctr">
+            <a:noAutofit/>
+          </a:bodyPr>
+          <a:lstStyle>
+            <a:lvl1pPr algn="l" defTabSz="914400" rtl="0" eaLnBrk="1" latinLnBrk="0" hangingPunct="1">
+              <a:lnSpc>
+                <a:spcPct val="90000"/>
+              </a:lnSpc>
+              <a:spcBef>
+                <a:spcPct val="0"/>
+              </a:spcBef>
+              <a:buNone/>
+              <a:defRPr sz="4400" kern="1200">
+                <a:solidFill>
+                  <a:schemeClr val="tx1"/>
+                </a:solidFill>
+                <a:latin typeface="+mj-lt"/>
+                <a:ea typeface="+mj-ea"/>
+                <a:cs typeface="+mj-cs"/>
+              </a:defRPr>
+            </a:lvl1pPr>
+          </a:lstStyle>
+          <a:p>
+            <a:pPr algn="ctr"/>
+            <a:r>
+              <a:rPr lang="pt-BR" sz="4800" b="1" dirty="0">
+                <a:solidFill>
+                  <a:srgbClr val="F46524"/>
+                </a:solidFill>
+                <a:latin typeface="Arial" panose="020B0604020202020204" pitchFamily="34" charset="0"/>
+                <a:cs typeface="Arial" panose="020B0604020202020204" pitchFamily="34" charset="0"/>
+              </a:rPr>
+              <a:t>The </a:t>
+            </a:r>
+            <a:r>
+              <a:rPr lang="pt-BR" sz="4800" b="1" dirty="0" err="1">
+                <a:solidFill>
+                  <a:srgbClr val="F46524"/>
+                </a:solidFill>
+                <a:latin typeface="Arial" panose="020B0604020202020204" pitchFamily="34" charset="0"/>
+                <a:cs typeface="Arial" panose="020B0604020202020204" pitchFamily="34" charset="0"/>
+              </a:rPr>
+              <a:t>Component</a:t>
+            </a:r>
+            <a:r>
+              <a:rPr lang="pt-BR" sz="4800" b="1" dirty="0">
+                <a:solidFill>
+                  <a:srgbClr val="F46524"/>
+                </a:solidFill>
+                <a:latin typeface="Arial" panose="020B0604020202020204" pitchFamily="34" charset="0"/>
+                <a:cs typeface="Arial" panose="020B0604020202020204" pitchFamily="34" charset="0"/>
+              </a:rPr>
+              <a:t> </a:t>
+            </a:r>
+            <a:r>
+              <a:rPr lang="pt-BR" sz="4800" b="1" dirty="0" err="1">
+                <a:solidFill>
+                  <a:srgbClr val="F46524"/>
+                </a:solidFill>
+                <a:latin typeface="Arial" panose="020B0604020202020204" pitchFamily="34" charset="0"/>
+                <a:cs typeface="Arial" panose="020B0604020202020204" pitchFamily="34" charset="0"/>
+              </a:rPr>
+              <a:t>Lifecycle</a:t>
+            </a:r>
+            <a:endParaRPr lang="pt-BR" sz="4800" b="1" dirty="0">
+              <a:solidFill>
+                <a:srgbClr val="F46524"/>
+              </a:solidFill>
+              <a:latin typeface="Arial" panose="020B0604020202020204" pitchFamily="34" charset="0"/>
+              <a:cs typeface="Arial" panose="020B0604020202020204" pitchFamily="34" charset="0"/>
+            </a:endParaRPr>
+          </a:p>
+        </p:txBody>
+      </p:sp>
+      <p:pic>
+        <p:nvPicPr>
+          <p:cNvPr id="7" name="Imagem 6">
+            <a:extLst>
+              <a:ext uri="{FF2B5EF4-FFF2-40B4-BE49-F238E27FC236}">
+                <a16:creationId xmlns:a16="http://schemas.microsoft.com/office/drawing/2014/main" id="{4E6DF7A4-AA0F-4323-8CC2-D016FEA6DF7B}"/>
+              </a:ext>
+            </a:extLst>
+          </p:cNvPr>
+          <p:cNvPicPr>
+            <a:picLocks noChangeAspect="1"/>
+          </p:cNvPicPr>
+          <p:nvPr/>
+        </p:nvPicPr>
+        <p:blipFill>
+          <a:blip r:embed="rId3"/>
+          <a:stretch>
+            <a:fillRect/>
+          </a:stretch>
+        </p:blipFill>
+        <p:spPr>
+          <a:xfrm>
+            <a:off x="10258887" y="122968"/>
+            <a:ext cx="1447800" cy="790575"/>
+          </a:xfrm>
+          <a:prstGeom prst="rect">
+            <a:avLst/>
+          </a:prstGeom>
+        </p:spPr>
+      </p:pic>
+      <p:pic>
+        <p:nvPicPr>
+          <p:cNvPr id="8" name="Imagem 7">
+            <a:extLst>
+              <a:ext uri="{FF2B5EF4-FFF2-40B4-BE49-F238E27FC236}">
+                <a16:creationId xmlns:a16="http://schemas.microsoft.com/office/drawing/2014/main" id="{4A328260-2ADB-4693-9112-53AB287FD66C}"/>
+              </a:ext>
+            </a:extLst>
+          </p:cNvPr>
+          <p:cNvPicPr>
+            <a:picLocks noChangeAspect="1"/>
+          </p:cNvPicPr>
+          <p:nvPr/>
+        </p:nvPicPr>
+        <p:blipFill>
+          <a:blip r:embed="rId4"/>
+          <a:stretch>
+            <a:fillRect/>
+          </a:stretch>
+        </p:blipFill>
+        <p:spPr>
+          <a:xfrm>
+            <a:off x="0" y="0"/>
+            <a:ext cx="1419225" cy="1495425"/>
+          </a:xfrm>
+          <a:prstGeom prst="rect">
+            <a:avLst/>
+          </a:prstGeom>
+        </p:spPr>
+      </p:pic>
+    </p:spTree>
+    <p:extLst>
+      <p:ext uri="{BB962C8B-B14F-4D97-AF65-F5344CB8AC3E}">
+        <p14:creationId xmlns:p14="http://schemas.microsoft.com/office/powerpoint/2010/main" val="818706182"/>
+      </p:ext>
+    </p:extLst>
+  </p:cSld>
+  <p:clrMapOvr>
+    <a:masterClrMapping/>
+  </p:clrMapOvr>
+  <p:timing>
+    <p:tnLst>
+      <p:par>
+        <p:cTn id="1" dur="indefinite" restart="never" nodeType="tmRoot">
+          <p:childTnLst>
+            <p:seq concurrent="1" nextAc="seek">
+              <p:cTn id="2" dur="indefinite" nodeType="mainSeq">
+                <p:childTnLst>
+                  <p:par>
+                    <p:cTn id="3" fill="hold">
+                      <p:stCondLst>
+                        <p:cond delay="indefinite"/>
+                      </p:stCondLst>
+                      <p:childTnLst>
+                        <p:par>
+                          <p:cTn id="4" fill="hold">
+                            <p:stCondLst>
+                              <p:cond delay="0"/>
+                            </p:stCondLst>
+                            <p:childTnLst>
+                              <p:par>
+                                <p:cTn id="5" presetID="2" presetClass="entr" presetSubtype="4" fill="hold" nodeType="clickEffect">
+                                  <p:stCondLst>
+                                    <p:cond delay="0"/>
+                                  </p:stCondLst>
+                                  <p:childTnLst>
+                                    <p:set>
+                                      <p:cBhvr>
+                                        <p:cTn id="6" dur="1" fill="hold">
+                                          <p:stCondLst>
+                                            <p:cond delay="0"/>
+                                          </p:stCondLst>
+                                        </p:cTn>
+                                        <p:tgtEl>
+                                          <p:spTgt spid="3">
+                                            <p:txEl>
+                                              <p:pRg st="0" end="0"/>
+                                            </p:txEl>
+                                          </p:spTgt>
+                                        </p:tgtEl>
+                                        <p:attrNameLst>
+                                          <p:attrName>style.visibility</p:attrName>
+                                        </p:attrNameLst>
+                                      </p:cBhvr>
+                                      <p:to>
+                                        <p:strVal val="visible"/>
+                                      </p:to>
+                                    </p:set>
+                                    <p:anim calcmode="lin" valueType="num">
+                                      <p:cBhvr additive="base">
+                                        <p:cTn id="7" dur="500" fill="hold"/>
+                                        <p:tgtEl>
+                                          <p:spTgt spid="3">
+                                            <p:txEl>
+                                              <p:pRg st="0" end="0"/>
+                                            </p:txEl>
+                                          </p:spTgt>
+                                        </p:tgtEl>
+                                        <p:attrNameLst>
+                                          <p:attrName>ppt_x</p:attrName>
+                                        </p:attrNameLst>
+                                      </p:cBhvr>
+                                      <p:tavLst>
+                                        <p:tav tm="0">
+                                          <p:val>
+                                            <p:strVal val="#ppt_x"/>
+                                          </p:val>
+                                        </p:tav>
+                                        <p:tav tm="100000">
+                                          <p:val>
+                                            <p:strVal val="#ppt_x"/>
+                                          </p:val>
+                                        </p:tav>
+                                      </p:tavLst>
+                                    </p:anim>
+                                    <p:anim calcmode="lin" valueType="num">
+                                      <p:cBhvr additive="base">
+                                        <p:cTn id="8" dur="500" fill="hold"/>
+                                        <p:tgtEl>
+                                          <p:spTgt spid="3">
+                                            <p:txEl>
+                                              <p:pRg st="0" end="0"/>
+                                            </p:txEl>
+                                          </p:spTgt>
+                                        </p:tgtEl>
+                                        <p:attrNameLst>
+                                          <p:attrName>ppt_y</p:attrName>
+                                        </p:attrNameLst>
+                                      </p:cBhvr>
+                                      <p:tavLst>
+                                        <p:tav tm="0">
+                                          <p:val>
+                                            <p:strVal val="1+#ppt_h/2"/>
+                                          </p:val>
+                                        </p:tav>
+                                        <p:tav tm="100000">
+                                          <p:val>
+                                            <p:strVal val="#ppt_y"/>
+                                          </p:val>
+                                        </p:tav>
+                                      </p:tavLst>
+                                    </p:anim>
+                                  </p:childTnLst>
+                                </p:cTn>
+                              </p:par>
+                            </p:childTnLst>
+                          </p:cTn>
+                        </p:par>
+                      </p:childTnLst>
+                    </p:cTn>
+                  </p:par>
+                  <p:par>
+                    <p:cTn id="9" fill="hold">
+                      <p:stCondLst>
+                        <p:cond delay="indefinite"/>
+                      </p:stCondLst>
+                      <p:childTnLst>
+                        <p:par>
+                          <p:cTn id="10" fill="hold">
+                            <p:stCondLst>
+                              <p:cond delay="0"/>
+                            </p:stCondLst>
+                            <p:childTnLst>
+                              <p:par>
+                                <p:cTn id="11" presetID="2" presetClass="entr" presetSubtype="4" fill="hold" nodeType="clickEffect">
+                                  <p:stCondLst>
+                                    <p:cond delay="0"/>
+                                  </p:stCondLst>
+                                  <p:childTnLst>
+                                    <p:set>
+                                      <p:cBhvr>
+                                        <p:cTn id="12" dur="1" fill="hold">
+                                          <p:stCondLst>
+                                            <p:cond delay="0"/>
+                                          </p:stCondLst>
+                                        </p:cTn>
+                                        <p:tgtEl>
+                                          <p:spTgt spid="3">
+                                            <p:txEl>
+                                              <p:pRg st="1" end="1"/>
+                                            </p:txEl>
+                                          </p:spTgt>
+                                        </p:tgtEl>
+                                        <p:attrNameLst>
+                                          <p:attrName>style.visibility</p:attrName>
+                                        </p:attrNameLst>
+                                      </p:cBhvr>
+                                      <p:to>
+                                        <p:strVal val="visible"/>
+                                      </p:to>
+                                    </p:set>
+                                    <p:anim calcmode="lin" valueType="num">
+                                      <p:cBhvr additive="base">
+                                        <p:cTn id="13" dur="500" fill="hold"/>
+                                        <p:tgtEl>
+                                          <p:spTgt spid="3">
+                                            <p:txEl>
+                                              <p:pRg st="1" end="1"/>
+                                            </p:txEl>
+                                          </p:spTgt>
+                                        </p:tgtEl>
+                                        <p:attrNameLst>
+                                          <p:attrName>ppt_x</p:attrName>
+                                        </p:attrNameLst>
+                                      </p:cBhvr>
+                                      <p:tavLst>
+                                        <p:tav tm="0">
+                                          <p:val>
+                                            <p:strVal val="#ppt_x"/>
+                                          </p:val>
+                                        </p:tav>
+                                        <p:tav tm="100000">
+                                          <p:val>
+                                            <p:strVal val="#ppt_x"/>
+                                          </p:val>
+                                        </p:tav>
+                                      </p:tavLst>
+                                    </p:anim>
+                                    <p:anim calcmode="lin" valueType="num">
+                                      <p:cBhvr additive="base">
+                                        <p:cTn id="14" dur="500" fill="hold"/>
+                                        <p:tgtEl>
+                                          <p:spTgt spid="3">
+                                            <p:txEl>
+                                              <p:pRg st="1" end="1"/>
+                                            </p:txEl>
+                                          </p:spTgt>
+                                        </p:tgtEl>
+                                        <p:attrNameLst>
+                                          <p:attrName>ppt_y</p:attrName>
+                                        </p:attrNameLst>
+                                      </p:cBhvr>
+                                      <p:tavLst>
+                                        <p:tav tm="0">
+                                          <p:val>
+                                            <p:strVal val="1+#ppt_h/2"/>
+                                          </p:val>
+                                        </p:tav>
+                                        <p:tav tm="100000">
+                                          <p:val>
+                                            <p:strVal val="#ppt_y"/>
+                                          </p:val>
+                                        </p:tav>
+                                      </p:tavLst>
+                                    </p:anim>
+                                  </p:childTnLst>
+                                </p:cTn>
+                              </p:par>
+                            </p:childTnLst>
+                          </p:cTn>
+                        </p:par>
+                      </p:childTnLst>
+                    </p:cTn>
+                  </p:par>
+                </p:childTnLst>
+              </p:cTn>
+              <p:prevCondLst>
+                <p:cond evt="onPrev" delay="0">
+                  <p:tgtEl>
+                    <p:sldTgt/>
+                  </p:tgtEl>
+                </p:cond>
+              </p:prevCondLst>
+              <p:nextCondLst>
+                <p:cond evt="onNext" delay="0">
+                  <p:tgtEl>
+                    <p:sldTgt/>
+                  </p:tgtEl>
+                </p:cond>
+              </p:nextCondLst>
+            </p:seq>
+          </p:childTnLst>
+        </p:cTn>
+      </p:par>
+    </p:tnLst>
+  </p:timing>
+</p:sld>
+</file>
+
+<file path=ppt/slides/slide17.xml><?xml version="1.0" encoding="utf-8"?>
+<p:sld xmlns:a="http://schemas.openxmlformats.org/drawingml/2006/main" xmlns:r="http://schemas.openxmlformats.org/officeDocument/2006/relationships" xmlns:p="http://schemas.openxmlformats.org/presentationml/2006/main">
+  <p:cSld>
+    <p:spTree>
+      <p:nvGrpSpPr>
+        <p:cNvPr id="1" name=""/>
+        <p:cNvGrpSpPr/>
+        <p:nvPr/>
+      </p:nvGrpSpPr>
+      <p:grpSpPr>
+        <a:xfrm>
+          <a:off x="0" y="0"/>
+          <a:ext cx="0" cy="0"/>
+          <a:chOff x="0" y="0"/>
+          <a:chExt cx="0" cy="0"/>
+        </a:xfrm>
+      </p:grpSpPr>
+      <p:sp>
+        <p:nvSpPr>
+          <p:cNvPr id="3" name="Espaço Reservado para Conteúdo 2">
+            <a:extLst>
+              <a:ext uri="{FF2B5EF4-FFF2-40B4-BE49-F238E27FC236}">
+                <a16:creationId xmlns:a16="http://schemas.microsoft.com/office/drawing/2014/main" id="{1C54187F-8492-4796-96CD-9E4382E87C6F}"/>
+              </a:ext>
+            </a:extLst>
+          </p:cNvPr>
+          <p:cNvSpPr>
+            <a:spLocks noGrp="1"/>
+          </p:cNvSpPr>
+          <p:nvPr>
+            <p:ph idx="1"/>
+          </p:nvPr>
+        </p:nvSpPr>
+        <p:spPr/>
+        <p:txBody>
+          <a:bodyPr>
+            <a:normAutofit/>
+          </a:bodyPr>
+          <a:lstStyle/>
+          <a:p>
+            <a:pPr algn="just">
+              <a:buFont typeface="Wingdings" panose="05000000000000000000" pitchFamily="2" charset="2"/>
+              <a:buChar char="Ø"/>
+            </a:pPr>
+            <a:r>
+              <a:rPr lang="pt-BR" dirty="0">
+                <a:latin typeface="Arial" panose="020B0604020202020204" pitchFamily="34" charset="0"/>
+                <a:cs typeface="Arial" panose="020B0604020202020204" pitchFamily="34" charset="0"/>
+              </a:rPr>
+              <a:t>Criação</a:t>
+            </a:r>
+          </a:p>
+          <a:p>
+            <a:pPr lvl="1" algn="just"/>
+            <a:r>
+              <a:rPr lang="en-US" dirty="0" err="1">
+                <a:latin typeface="Arial" panose="020B0604020202020204" pitchFamily="34" charset="0"/>
+                <a:cs typeface="Arial" panose="020B0604020202020204" pitchFamily="34" charset="0"/>
+                <a:hlinkClick r:id="rId2">
+                  <a:extLst>
+                    <a:ext uri="{A12FA001-AC4F-418D-AE19-62706E023703}">
+                      <ahyp:hlinkClr xmlns:ahyp="http://schemas.microsoft.com/office/drawing/2018/hyperlinkcolor" val="tx"/>
+                    </a:ext>
+                  </a:extLst>
+                </a:hlinkClick>
+              </a:rPr>
+              <a:t>componentWillMount</a:t>
+            </a:r>
+            <a:r>
+              <a:rPr lang="en-US" dirty="0">
+                <a:latin typeface="Arial" panose="020B0604020202020204" pitchFamily="34" charset="0"/>
+                <a:cs typeface="Arial" panose="020B0604020202020204" pitchFamily="34" charset="0"/>
+              </a:rPr>
+              <a:t> - </a:t>
+            </a:r>
+            <a:r>
+              <a:rPr lang="pt-BR" dirty="0"/>
+              <a:t>Esse método é executado imediatamente antes do componente ser montado, e antes do método </a:t>
+            </a:r>
+            <a:r>
+              <a:rPr lang="pt-BR" b="1" dirty="0"/>
+              <a:t>render. </a:t>
+            </a:r>
+            <a:r>
+              <a:rPr lang="pt-BR" dirty="0"/>
+              <a:t>Nesse método, é possível alterar o </a:t>
+            </a:r>
+            <a:r>
+              <a:rPr lang="pt-BR" dirty="0" err="1"/>
+              <a:t>state</a:t>
+            </a:r>
+            <a:r>
+              <a:rPr lang="pt-BR" dirty="0"/>
+              <a:t> através do </a:t>
+            </a:r>
+            <a:r>
+              <a:rPr lang="pt-BR" b="1" dirty="0" err="1"/>
+              <a:t>this.setState</a:t>
+            </a:r>
+            <a:r>
+              <a:rPr lang="pt-BR" dirty="0"/>
+              <a:t>. Porém, é preferível fazer o mesmo no </a:t>
+            </a:r>
+            <a:r>
+              <a:rPr lang="pt-BR" b="1" dirty="0" err="1"/>
+              <a:t>constructor</a:t>
+            </a:r>
+            <a:r>
+              <a:rPr lang="pt-BR" dirty="0"/>
+              <a:t>, já que os dois possuem funcionalidade similar</a:t>
+            </a:r>
+            <a:endParaRPr lang="pt-BR" dirty="0">
+              <a:latin typeface="Arial" panose="020B0604020202020204" pitchFamily="34" charset="0"/>
+              <a:cs typeface="Arial" panose="020B0604020202020204" pitchFamily="34" charset="0"/>
+            </a:endParaRPr>
+          </a:p>
+        </p:txBody>
+      </p:sp>
+      <p:sp>
+        <p:nvSpPr>
+          <p:cNvPr id="6" name="Título 1">
+            <a:extLst>
+              <a:ext uri="{FF2B5EF4-FFF2-40B4-BE49-F238E27FC236}">
+                <a16:creationId xmlns:a16="http://schemas.microsoft.com/office/drawing/2014/main" id="{62E1AAE0-A067-4119-BE22-1FE8351FD147}"/>
+              </a:ext>
+            </a:extLst>
+          </p:cNvPr>
+          <p:cNvSpPr txBox="1">
+            <a:spLocks/>
+          </p:cNvSpPr>
+          <p:nvPr/>
+        </p:nvSpPr>
+        <p:spPr>
+          <a:xfrm>
+            <a:off x="0" y="122968"/>
+            <a:ext cx="12192000" cy="854430"/>
+          </a:xfrm>
+          <a:prstGeom prst="rect">
+            <a:avLst/>
+          </a:prstGeom>
+        </p:spPr>
+        <p:txBody>
+          <a:bodyPr vert="horz" lIns="91440" tIns="45720" rIns="91440" bIns="45720" rtlCol="0" anchor="ctr">
+            <a:noAutofit/>
+          </a:bodyPr>
+          <a:lstStyle>
+            <a:lvl1pPr algn="l" defTabSz="914400" rtl="0" eaLnBrk="1" latinLnBrk="0" hangingPunct="1">
+              <a:lnSpc>
+                <a:spcPct val="90000"/>
+              </a:lnSpc>
+              <a:spcBef>
+                <a:spcPct val="0"/>
+              </a:spcBef>
+              <a:buNone/>
+              <a:defRPr sz="4400" kern="1200">
+                <a:solidFill>
+                  <a:schemeClr val="tx1"/>
+                </a:solidFill>
+                <a:latin typeface="+mj-lt"/>
+                <a:ea typeface="+mj-ea"/>
+                <a:cs typeface="+mj-cs"/>
+              </a:defRPr>
+            </a:lvl1pPr>
+          </a:lstStyle>
+          <a:p>
+            <a:pPr algn="ctr"/>
+            <a:r>
+              <a:rPr lang="pt-BR" sz="4800" b="1" dirty="0">
+                <a:solidFill>
+                  <a:srgbClr val="F46524"/>
+                </a:solidFill>
+                <a:latin typeface="Arial" panose="020B0604020202020204" pitchFamily="34" charset="0"/>
+                <a:cs typeface="Arial" panose="020B0604020202020204" pitchFamily="34" charset="0"/>
+              </a:rPr>
+              <a:t>The </a:t>
+            </a:r>
+            <a:r>
+              <a:rPr lang="pt-BR" sz="4800" b="1" dirty="0" err="1">
+                <a:solidFill>
+                  <a:srgbClr val="F46524"/>
+                </a:solidFill>
+                <a:latin typeface="Arial" panose="020B0604020202020204" pitchFamily="34" charset="0"/>
+                <a:cs typeface="Arial" panose="020B0604020202020204" pitchFamily="34" charset="0"/>
+              </a:rPr>
+              <a:t>Component</a:t>
+            </a:r>
+            <a:r>
+              <a:rPr lang="pt-BR" sz="4800" b="1" dirty="0">
+                <a:solidFill>
+                  <a:srgbClr val="F46524"/>
+                </a:solidFill>
+                <a:latin typeface="Arial" panose="020B0604020202020204" pitchFamily="34" charset="0"/>
+                <a:cs typeface="Arial" panose="020B0604020202020204" pitchFamily="34" charset="0"/>
+              </a:rPr>
+              <a:t> </a:t>
+            </a:r>
+            <a:r>
+              <a:rPr lang="pt-BR" sz="4800" b="1" dirty="0" err="1">
+                <a:solidFill>
+                  <a:srgbClr val="F46524"/>
+                </a:solidFill>
+                <a:latin typeface="Arial" panose="020B0604020202020204" pitchFamily="34" charset="0"/>
+                <a:cs typeface="Arial" panose="020B0604020202020204" pitchFamily="34" charset="0"/>
+              </a:rPr>
+              <a:t>Lifecycle</a:t>
+            </a:r>
+            <a:endParaRPr lang="pt-BR" sz="4800" b="1" dirty="0">
+              <a:solidFill>
+                <a:srgbClr val="F46524"/>
+              </a:solidFill>
+              <a:latin typeface="Arial" panose="020B0604020202020204" pitchFamily="34" charset="0"/>
+              <a:cs typeface="Arial" panose="020B0604020202020204" pitchFamily="34" charset="0"/>
+            </a:endParaRPr>
+          </a:p>
+        </p:txBody>
+      </p:sp>
+      <p:pic>
+        <p:nvPicPr>
+          <p:cNvPr id="7" name="Imagem 6">
+            <a:extLst>
+              <a:ext uri="{FF2B5EF4-FFF2-40B4-BE49-F238E27FC236}">
+                <a16:creationId xmlns:a16="http://schemas.microsoft.com/office/drawing/2014/main" id="{4E6DF7A4-AA0F-4323-8CC2-D016FEA6DF7B}"/>
+              </a:ext>
+            </a:extLst>
+          </p:cNvPr>
+          <p:cNvPicPr>
+            <a:picLocks noChangeAspect="1"/>
+          </p:cNvPicPr>
+          <p:nvPr/>
+        </p:nvPicPr>
+        <p:blipFill>
+          <a:blip r:embed="rId3"/>
+          <a:stretch>
+            <a:fillRect/>
+          </a:stretch>
+        </p:blipFill>
+        <p:spPr>
+          <a:xfrm>
+            <a:off x="10258887" y="122968"/>
+            <a:ext cx="1447800" cy="790575"/>
+          </a:xfrm>
+          <a:prstGeom prst="rect">
+            <a:avLst/>
+          </a:prstGeom>
+        </p:spPr>
+      </p:pic>
+      <p:pic>
+        <p:nvPicPr>
+          <p:cNvPr id="8" name="Imagem 7">
+            <a:extLst>
+              <a:ext uri="{FF2B5EF4-FFF2-40B4-BE49-F238E27FC236}">
+                <a16:creationId xmlns:a16="http://schemas.microsoft.com/office/drawing/2014/main" id="{4A328260-2ADB-4693-9112-53AB287FD66C}"/>
+              </a:ext>
+            </a:extLst>
+          </p:cNvPr>
+          <p:cNvPicPr>
+            <a:picLocks noChangeAspect="1"/>
+          </p:cNvPicPr>
+          <p:nvPr/>
+        </p:nvPicPr>
+        <p:blipFill>
+          <a:blip r:embed="rId4"/>
+          <a:stretch>
+            <a:fillRect/>
+          </a:stretch>
+        </p:blipFill>
+        <p:spPr>
+          <a:xfrm>
+            <a:off x="0" y="0"/>
+            <a:ext cx="1419225" cy="1495425"/>
+          </a:xfrm>
+          <a:prstGeom prst="rect">
+            <a:avLst/>
+          </a:prstGeom>
+        </p:spPr>
+      </p:pic>
+    </p:spTree>
+    <p:extLst>
+      <p:ext uri="{BB962C8B-B14F-4D97-AF65-F5344CB8AC3E}">
+        <p14:creationId xmlns:p14="http://schemas.microsoft.com/office/powerpoint/2010/main" val="2993348308"/>
+      </p:ext>
+    </p:extLst>
+  </p:cSld>
+  <p:clrMapOvr>
+    <a:masterClrMapping/>
+  </p:clrMapOvr>
+  <p:timing>
+    <p:tnLst>
+      <p:par>
+        <p:cTn id="1" dur="indefinite" restart="never" nodeType="tmRoot">
+          <p:childTnLst>
+            <p:seq concurrent="1" nextAc="seek">
+              <p:cTn id="2" dur="indefinite" nodeType="mainSeq">
+                <p:childTnLst>
+                  <p:par>
+                    <p:cTn id="3" fill="hold">
+                      <p:stCondLst>
+                        <p:cond delay="indefinite"/>
+                      </p:stCondLst>
+                      <p:childTnLst>
+                        <p:par>
+                          <p:cTn id="4" fill="hold">
+                            <p:stCondLst>
+                              <p:cond delay="0"/>
+                            </p:stCondLst>
+                            <p:childTnLst>
+                              <p:par>
+                                <p:cTn id="5" presetID="2" presetClass="entr" presetSubtype="4" fill="hold" nodeType="clickEffect">
+                                  <p:stCondLst>
+                                    <p:cond delay="0"/>
+                                  </p:stCondLst>
+                                  <p:childTnLst>
+                                    <p:set>
+                                      <p:cBhvr>
+                                        <p:cTn id="6" dur="1" fill="hold">
+                                          <p:stCondLst>
+                                            <p:cond delay="0"/>
+                                          </p:stCondLst>
+                                        </p:cTn>
+                                        <p:tgtEl>
+                                          <p:spTgt spid="3">
+                                            <p:txEl>
+                                              <p:pRg st="0" end="0"/>
+                                            </p:txEl>
+                                          </p:spTgt>
+                                        </p:tgtEl>
+                                        <p:attrNameLst>
+                                          <p:attrName>style.visibility</p:attrName>
+                                        </p:attrNameLst>
+                                      </p:cBhvr>
+                                      <p:to>
+                                        <p:strVal val="visible"/>
+                                      </p:to>
+                                    </p:set>
+                                    <p:anim calcmode="lin" valueType="num">
+                                      <p:cBhvr additive="base">
+                                        <p:cTn id="7" dur="500" fill="hold"/>
+                                        <p:tgtEl>
+                                          <p:spTgt spid="3">
+                                            <p:txEl>
+                                              <p:pRg st="0" end="0"/>
+                                            </p:txEl>
+                                          </p:spTgt>
+                                        </p:tgtEl>
+                                        <p:attrNameLst>
+                                          <p:attrName>ppt_x</p:attrName>
+                                        </p:attrNameLst>
+                                      </p:cBhvr>
+                                      <p:tavLst>
+                                        <p:tav tm="0">
+                                          <p:val>
+                                            <p:strVal val="#ppt_x"/>
+                                          </p:val>
+                                        </p:tav>
+                                        <p:tav tm="100000">
+                                          <p:val>
+                                            <p:strVal val="#ppt_x"/>
+                                          </p:val>
+                                        </p:tav>
+                                      </p:tavLst>
+                                    </p:anim>
+                                    <p:anim calcmode="lin" valueType="num">
+                                      <p:cBhvr additive="base">
+                                        <p:cTn id="8" dur="500" fill="hold"/>
+                                        <p:tgtEl>
+                                          <p:spTgt spid="3">
+                                            <p:txEl>
+                                              <p:pRg st="0" end="0"/>
+                                            </p:txEl>
+                                          </p:spTgt>
+                                        </p:tgtEl>
+                                        <p:attrNameLst>
+                                          <p:attrName>ppt_y</p:attrName>
+                                        </p:attrNameLst>
+                                      </p:cBhvr>
+                                      <p:tavLst>
+                                        <p:tav tm="0">
+                                          <p:val>
+                                            <p:strVal val="1+#ppt_h/2"/>
+                                          </p:val>
+                                        </p:tav>
+                                        <p:tav tm="100000">
+                                          <p:val>
+                                            <p:strVal val="#ppt_y"/>
+                                          </p:val>
+                                        </p:tav>
+                                      </p:tavLst>
+                                    </p:anim>
+                                  </p:childTnLst>
+                                </p:cTn>
+                              </p:par>
+                            </p:childTnLst>
+                          </p:cTn>
+                        </p:par>
+                      </p:childTnLst>
+                    </p:cTn>
+                  </p:par>
+                  <p:par>
+                    <p:cTn id="9" fill="hold">
+                      <p:stCondLst>
+                        <p:cond delay="indefinite"/>
+                      </p:stCondLst>
+                      <p:childTnLst>
+                        <p:par>
+                          <p:cTn id="10" fill="hold">
+                            <p:stCondLst>
+                              <p:cond delay="0"/>
+                            </p:stCondLst>
+                            <p:childTnLst>
+                              <p:par>
+                                <p:cTn id="11" presetID="2" presetClass="entr" presetSubtype="4" fill="hold" nodeType="clickEffect">
+                                  <p:stCondLst>
+                                    <p:cond delay="0"/>
+                                  </p:stCondLst>
+                                  <p:childTnLst>
+                                    <p:set>
+                                      <p:cBhvr>
+                                        <p:cTn id="12" dur="1" fill="hold">
+                                          <p:stCondLst>
+                                            <p:cond delay="0"/>
+                                          </p:stCondLst>
+                                        </p:cTn>
+                                        <p:tgtEl>
+                                          <p:spTgt spid="3">
+                                            <p:txEl>
+                                              <p:pRg st="1" end="1"/>
+                                            </p:txEl>
+                                          </p:spTgt>
+                                        </p:tgtEl>
+                                        <p:attrNameLst>
+                                          <p:attrName>style.visibility</p:attrName>
+                                        </p:attrNameLst>
+                                      </p:cBhvr>
+                                      <p:to>
+                                        <p:strVal val="visible"/>
+                                      </p:to>
+                                    </p:set>
+                                    <p:anim calcmode="lin" valueType="num">
+                                      <p:cBhvr additive="base">
+                                        <p:cTn id="13" dur="500" fill="hold"/>
+                                        <p:tgtEl>
+                                          <p:spTgt spid="3">
+                                            <p:txEl>
+                                              <p:pRg st="1" end="1"/>
+                                            </p:txEl>
+                                          </p:spTgt>
+                                        </p:tgtEl>
+                                        <p:attrNameLst>
+                                          <p:attrName>ppt_x</p:attrName>
+                                        </p:attrNameLst>
+                                      </p:cBhvr>
+                                      <p:tavLst>
+                                        <p:tav tm="0">
+                                          <p:val>
+                                            <p:strVal val="#ppt_x"/>
+                                          </p:val>
+                                        </p:tav>
+                                        <p:tav tm="100000">
+                                          <p:val>
+                                            <p:strVal val="#ppt_x"/>
+                                          </p:val>
+                                        </p:tav>
+                                      </p:tavLst>
+                                    </p:anim>
+                                    <p:anim calcmode="lin" valueType="num">
+                                      <p:cBhvr additive="base">
+                                        <p:cTn id="14" dur="500" fill="hold"/>
+                                        <p:tgtEl>
+                                          <p:spTgt spid="3">
+                                            <p:txEl>
+                                              <p:pRg st="1" end="1"/>
+                                            </p:txEl>
+                                          </p:spTgt>
+                                        </p:tgtEl>
+                                        <p:attrNameLst>
+                                          <p:attrName>ppt_y</p:attrName>
+                                        </p:attrNameLst>
+                                      </p:cBhvr>
+                                      <p:tavLst>
+                                        <p:tav tm="0">
+                                          <p:val>
+                                            <p:strVal val="1+#ppt_h/2"/>
+                                          </p:val>
+                                        </p:tav>
+                                        <p:tav tm="100000">
+                                          <p:val>
+                                            <p:strVal val="#ppt_y"/>
+                                          </p:val>
+                                        </p:tav>
+                                      </p:tavLst>
+                                    </p:anim>
+                                  </p:childTnLst>
+                                </p:cTn>
+                              </p:par>
+                            </p:childTnLst>
+                          </p:cTn>
+                        </p:par>
+                      </p:childTnLst>
+                    </p:cTn>
+                  </p:par>
+                </p:childTnLst>
+              </p:cTn>
+              <p:prevCondLst>
+                <p:cond evt="onPrev" delay="0">
+                  <p:tgtEl>
+                    <p:sldTgt/>
+                  </p:tgtEl>
+                </p:cond>
+              </p:prevCondLst>
+              <p:nextCondLst>
+                <p:cond evt="onNext" delay="0">
+                  <p:tgtEl>
+                    <p:sldTgt/>
+                  </p:tgtEl>
+                </p:cond>
+              </p:nextCondLst>
+            </p:seq>
+          </p:childTnLst>
+        </p:cTn>
+      </p:par>
+    </p:tnLst>
+  </p:timing>
+</p:sld>
+</file>
+
+<file path=ppt/slides/slide18.xml><?xml version="1.0" encoding="utf-8"?>
+<p:sld xmlns:a="http://schemas.openxmlformats.org/drawingml/2006/main" xmlns:r="http://schemas.openxmlformats.org/officeDocument/2006/relationships" xmlns:p="http://schemas.openxmlformats.org/presentationml/2006/main">
+  <p:cSld>
+    <p:spTree>
+      <p:nvGrpSpPr>
+        <p:cNvPr id="1" name=""/>
+        <p:cNvGrpSpPr/>
+        <p:nvPr/>
+      </p:nvGrpSpPr>
+      <p:grpSpPr>
+        <a:xfrm>
+          <a:off x="0" y="0"/>
+          <a:ext cx="0" cy="0"/>
+          <a:chOff x="0" y="0"/>
+          <a:chExt cx="0" cy="0"/>
+        </a:xfrm>
+      </p:grpSpPr>
+      <p:sp>
+        <p:nvSpPr>
+          <p:cNvPr id="3" name="Espaço Reservado para Conteúdo 2">
+            <a:extLst>
+              <a:ext uri="{FF2B5EF4-FFF2-40B4-BE49-F238E27FC236}">
+                <a16:creationId xmlns:a16="http://schemas.microsoft.com/office/drawing/2014/main" id="{1C54187F-8492-4796-96CD-9E4382E87C6F}"/>
+              </a:ext>
+            </a:extLst>
+          </p:cNvPr>
+          <p:cNvSpPr>
+            <a:spLocks noGrp="1"/>
+          </p:cNvSpPr>
+          <p:nvPr>
+            <p:ph idx="1"/>
+          </p:nvPr>
+        </p:nvSpPr>
+        <p:spPr/>
+        <p:txBody>
+          <a:bodyPr>
+            <a:normAutofit/>
+          </a:bodyPr>
+          <a:lstStyle/>
+          <a:p>
+            <a:pPr algn="just">
+              <a:buFont typeface="Wingdings" panose="05000000000000000000" pitchFamily="2" charset="2"/>
+              <a:buChar char="Ø"/>
+            </a:pPr>
+            <a:r>
+              <a:rPr lang="pt-BR" dirty="0">
+                <a:latin typeface="Arial" panose="020B0604020202020204" pitchFamily="34" charset="0"/>
+                <a:cs typeface="Arial" panose="020B0604020202020204" pitchFamily="34" charset="0"/>
+              </a:rPr>
+              <a:t>Criação</a:t>
+            </a:r>
+          </a:p>
+          <a:p>
+            <a:pPr lvl="1" algn="just"/>
+            <a:r>
+              <a:rPr lang="en-US" dirty="0">
+                <a:latin typeface="Arial" panose="020B0604020202020204" pitchFamily="34" charset="0"/>
+                <a:cs typeface="Arial" panose="020B0604020202020204" pitchFamily="34" charset="0"/>
+                <a:hlinkClick r:id="rId2">
+                  <a:extLst>
+                    <a:ext uri="{A12FA001-AC4F-418D-AE19-62706E023703}">
+                      <ahyp:hlinkClr xmlns:ahyp="http://schemas.microsoft.com/office/drawing/2018/hyperlinkcolor" val="tx"/>
+                    </a:ext>
+                  </a:extLst>
+                </a:hlinkClick>
+              </a:rPr>
+              <a:t>Render</a:t>
+            </a:r>
+            <a:r>
+              <a:rPr lang="en-US" dirty="0">
+                <a:latin typeface="Arial" panose="020B0604020202020204" pitchFamily="34" charset="0"/>
+                <a:cs typeface="Arial" panose="020B0604020202020204" pitchFamily="34" charset="0"/>
+              </a:rPr>
+              <a:t> - </a:t>
+            </a:r>
+            <a:r>
+              <a:rPr lang="pt-BR" dirty="0"/>
+              <a:t>No ciclo de montagem do componente, esse método é executado logo após </a:t>
+            </a:r>
+            <a:r>
+              <a:rPr lang="pt-BR" b="1" dirty="0" err="1"/>
+              <a:t>componentWillMount</a:t>
+            </a:r>
+            <a:r>
+              <a:rPr lang="pt-BR" dirty="0"/>
+              <a:t>, e o mesmo deve retornar o JSX do componente. Esse é o único método obrigatório. É importante manter o método </a:t>
+            </a:r>
+            <a:r>
+              <a:rPr lang="pt-BR" b="1" dirty="0"/>
+              <a:t>render</a:t>
+            </a:r>
+            <a:r>
+              <a:rPr lang="pt-BR" dirty="0"/>
+              <a:t> como uma função pura, uma vez que dados os mesmos </a:t>
+            </a:r>
+            <a:r>
+              <a:rPr lang="pt-BR" i="1" dirty="0" err="1"/>
+              <a:t>state</a:t>
+            </a:r>
+            <a:r>
+              <a:rPr lang="pt-BR" dirty="0"/>
+              <a:t> e </a:t>
+            </a:r>
+            <a:r>
+              <a:rPr lang="pt-BR" i="1" dirty="0" err="1"/>
+              <a:t>props</a:t>
+            </a:r>
+            <a:r>
+              <a:rPr lang="pt-BR" dirty="0"/>
+              <a:t>, ele retorne sempre o mesmo resultado. Não faça alterações ao estado de dentro desse método, utilize os outros métodos do </a:t>
+            </a:r>
+            <a:r>
+              <a:rPr lang="pt-BR" i="1" dirty="0" err="1"/>
+              <a:t>lifecycle</a:t>
+            </a:r>
+            <a:r>
+              <a:rPr lang="pt-BR" dirty="0"/>
+              <a:t> para o fazê-lo.</a:t>
+            </a:r>
+            <a:endParaRPr lang="en-US" dirty="0">
+              <a:latin typeface="Arial" panose="020B0604020202020204" pitchFamily="34" charset="0"/>
+              <a:cs typeface="Arial" panose="020B0604020202020204" pitchFamily="34" charset="0"/>
+            </a:endParaRPr>
+          </a:p>
+        </p:txBody>
+      </p:sp>
+      <p:sp>
+        <p:nvSpPr>
+          <p:cNvPr id="6" name="Título 1">
+            <a:extLst>
+              <a:ext uri="{FF2B5EF4-FFF2-40B4-BE49-F238E27FC236}">
+                <a16:creationId xmlns:a16="http://schemas.microsoft.com/office/drawing/2014/main" id="{62E1AAE0-A067-4119-BE22-1FE8351FD147}"/>
+              </a:ext>
+            </a:extLst>
+          </p:cNvPr>
+          <p:cNvSpPr txBox="1">
+            <a:spLocks/>
+          </p:cNvSpPr>
+          <p:nvPr/>
+        </p:nvSpPr>
+        <p:spPr>
+          <a:xfrm>
+            <a:off x="0" y="122968"/>
+            <a:ext cx="12192000" cy="854430"/>
+          </a:xfrm>
+          <a:prstGeom prst="rect">
+            <a:avLst/>
+          </a:prstGeom>
+        </p:spPr>
+        <p:txBody>
+          <a:bodyPr vert="horz" lIns="91440" tIns="45720" rIns="91440" bIns="45720" rtlCol="0" anchor="ctr">
+            <a:noAutofit/>
+          </a:bodyPr>
+          <a:lstStyle>
+            <a:lvl1pPr algn="l" defTabSz="914400" rtl="0" eaLnBrk="1" latinLnBrk="0" hangingPunct="1">
+              <a:lnSpc>
+                <a:spcPct val="90000"/>
+              </a:lnSpc>
+              <a:spcBef>
+                <a:spcPct val="0"/>
+              </a:spcBef>
+              <a:buNone/>
+              <a:defRPr sz="4400" kern="1200">
+                <a:solidFill>
+                  <a:schemeClr val="tx1"/>
+                </a:solidFill>
+                <a:latin typeface="+mj-lt"/>
+                <a:ea typeface="+mj-ea"/>
+                <a:cs typeface="+mj-cs"/>
+              </a:defRPr>
+            </a:lvl1pPr>
+          </a:lstStyle>
+          <a:p>
+            <a:pPr algn="ctr"/>
+            <a:r>
+              <a:rPr lang="pt-BR" sz="4800" b="1" dirty="0">
+                <a:solidFill>
+                  <a:srgbClr val="F46524"/>
+                </a:solidFill>
+                <a:latin typeface="Arial" panose="020B0604020202020204" pitchFamily="34" charset="0"/>
+                <a:cs typeface="Arial" panose="020B0604020202020204" pitchFamily="34" charset="0"/>
+              </a:rPr>
+              <a:t>The </a:t>
+            </a:r>
+            <a:r>
+              <a:rPr lang="pt-BR" sz="4800" b="1" dirty="0" err="1">
+                <a:solidFill>
+                  <a:srgbClr val="F46524"/>
+                </a:solidFill>
+                <a:latin typeface="Arial" panose="020B0604020202020204" pitchFamily="34" charset="0"/>
+                <a:cs typeface="Arial" panose="020B0604020202020204" pitchFamily="34" charset="0"/>
+              </a:rPr>
+              <a:t>Component</a:t>
+            </a:r>
+            <a:r>
+              <a:rPr lang="pt-BR" sz="4800" b="1" dirty="0">
+                <a:solidFill>
+                  <a:srgbClr val="F46524"/>
+                </a:solidFill>
+                <a:latin typeface="Arial" panose="020B0604020202020204" pitchFamily="34" charset="0"/>
+                <a:cs typeface="Arial" panose="020B0604020202020204" pitchFamily="34" charset="0"/>
+              </a:rPr>
+              <a:t> </a:t>
+            </a:r>
+            <a:r>
+              <a:rPr lang="pt-BR" sz="4800" b="1" dirty="0" err="1">
+                <a:solidFill>
+                  <a:srgbClr val="F46524"/>
+                </a:solidFill>
+                <a:latin typeface="Arial" panose="020B0604020202020204" pitchFamily="34" charset="0"/>
+                <a:cs typeface="Arial" panose="020B0604020202020204" pitchFamily="34" charset="0"/>
+              </a:rPr>
+              <a:t>Lifecycle</a:t>
+            </a:r>
+            <a:endParaRPr lang="pt-BR" sz="4800" b="1" dirty="0">
+              <a:solidFill>
+                <a:srgbClr val="F46524"/>
+              </a:solidFill>
+              <a:latin typeface="Arial" panose="020B0604020202020204" pitchFamily="34" charset="0"/>
+              <a:cs typeface="Arial" panose="020B0604020202020204" pitchFamily="34" charset="0"/>
+            </a:endParaRPr>
+          </a:p>
+        </p:txBody>
+      </p:sp>
+      <p:pic>
+        <p:nvPicPr>
+          <p:cNvPr id="7" name="Imagem 6">
+            <a:extLst>
+              <a:ext uri="{FF2B5EF4-FFF2-40B4-BE49-F238E27FC236}">
+                <a16:creationId xmlns:a16="http://schemas.microsoft.com/office/drawing/2014/main" id="{4E6DF7A4-AA0F-4323-8CC2-D016FEA6DF7B}"/>
+              </a:ext>
+            </a:extLst>
+          </p:cNvPr>
+          <p:cNvPicPr>
+            <a:picLocks noChangeAspect="1"/>
+          </p:cNvPicPr>
+          <p:nvPr/>
+        </p:nvPicPr>
+        <p:blipFill>
+          <a:blip r:embed="rId3"/>
+          <a:stretch>
+            <a:fillRect/>
+          </a:stretch>
+        </p:blipFill>
+        <p:spPr>
+          <a:xfrm>
+            <a:off x="10258887" y="122968"/>
+            <a:ext cx="1447800" cy="790575"/>
+          </a:xfrm>
+          <a:prstGeom prst="rect">
+            <a:avLst/>
+          </a:prstGeom>
+        </p:spPr>
+      </p:pic>
+      <p:pic>
+        <p:nvPicPr>
+          <p:cNvPr id="8" name="Imagem 7">
+            <a:extLst>
+              <a:ext uri="{FF2B5EF4-FFF2-40B4-BE49-F238E27FC236}">
+                <a16:creationId xmlns:a16="http://schemas.microsoft.com/office/drawing/2014/main" id="{4A328260-2ADB-4693-9112-53AB287FD66C}"/>
+              </a:ext>
+            </a:extLst>
+          </p:cNvPr>
+          <p:cNvPicPr>
+            <a:picLocks noChangeAspect="1"/>
+          </p:cNvPicPr>
+          <p:nvPr/>
+        </p:nvPicPr>
+        <p:blipFill>
+          <a:blip r:embed="rId4"/>
+          <a:stretch>
+            <a:fillRect/>
+          </a:stretch>
+        </p:blipFill>
+        <p:spPr>
+          <a:xfrm>
+            <a:off x="0" y="0"/>
+            <a:ext cx="1419225" cy="1495425"/>
+          </a:xfrm>
+          <a:prstGeom prst="rect">
+            <a:avLst/>
+          </a:prstGeom>
+        </p:spPr>
+      </p:pic>
+    </p:spTree>
+    <p:extLst>
+      <p:ext uri="{BB962C8B-B14F-4D97-AF65-F5344CB8AC3E}">
+        <p14:creationId xmlns:p14="http://schemas.microsoft.com/office/powerpoint/2010/main" val="3761525619"/>
+      </p:ext>
+    </p:extLst>
+  </p:cSld>
+  <p:clrMapOvr>
+    <a:masterClrMapping/>
+  </p:clrMapOvr>
+  <p:timing>
+    <p:tnLst>
+      <p:par>
+        <p:cTn id="1" dur="indefinite" restart="never" nodeType="tmRoot">
+          <p:childTnLst>
+            <p:seq concurrent="1" nextAc="seek">
+              <p:cTn id="2" dur="indefinite" nodeType="mainSeq">
+                <p:childTnLst>
+                  <p:par>
+                    <p:cTn id="3" fill="hold">
+                      <p:stCondLst>
+                        <p:cond delay="indefinite"/>
+                      </p:stCondLst>
+                      <p:childTnLst>
+                        <p:par>
+                          <p:cTn id="4" fill="hold">
+                            <p:stCondLst>
+                              <p:cond delay="0"/>
+                            </p:stCondLst>
+                            <p:childTnLst>
+                              <p:par>
+                                <p:cTn id="5" presetID="2" presetClass="entr" presetSubtype="4" fill="hold" nodeType="clickEffect">
+                                  <p:stCondLst>
+                                    <p:cond delay="0"/>
+                                  </p:stCondLst>
+                                  <p:childTnLst>
+                                    <p:set>
+                                      <p:cBhvr>
+                                        <p:cTn id="6" dur="1" fill="hold">
+                                          <p:stCondLst>
+                                            <p:cond delay="0"/>
+                                          </p:stCondLst>
+                                        </p:cTn>
+                                        <p:tgtEl>
+                                          <p:spTgt spid="3">
+                                            <p:txEl>
+                                              <p:pRg st="0" end="0"/>
+                                            </p:txEl>
+                                          </p:spTgt>
+                                        </p:tgtEl>
+                                        <p:attrNameLst>
+                                          <p:attrName>style.visibility</p:attrName>
+                                        </p:attrNameLst>
+                                      </p:cBhvr>
+                                      <p:to>
+                                        <p:strVal val="visible"/>
+                                      </p:to>
+                                    </p:set>
+                                    <p:anim calcmode="lin" valueType="num">
+                                      <p:cBhvr additive="base">
+                                        <p:cTn id="7" dur="500" fill="hold"/>
+                                        <p:tgtEl>
+                                          <p:spTgt spid="3">
+                                            <p:txEl>
+                                              <p:pRg st="0" end="0"/>
+                                            </p:txEl>
+                                          </p:spTgt>
+                                        </p:tgtEl>
+                                        <p:attrNameLst>
+                                          <p:attrName>ppt_x</p:attrName>
+                                        </p:attrNameLst>
+                                      </p:cBhvr>
+                                      <p:tavLst>
+                                        <p:tav tm="0">
+                                          <p:val>
+                                            <p:strVal val="#ppt_x"/>
+                                          </p:val>
+                                        </p:tav>
+                                        <p:tav tm="100000">
+                                          <p:val>
+                                            <p:strVal val="#ppt_x"/>
+                                          </p:val>
+                                        </p:tav>
+                                      </p:tavLst>
+                                    </p:anim>
+                                    <p:anim calcmode="lin" valueType="num">
+                                      <p:cBhvr additive="base">
+                                        <p:cTn id="8" dur="500" fill="hold"/>
+                                        <p:tgtEl>
+                                          <p:spTgt spid="3">
+                                            <p:txEl>
+                                              <p:pRg st="0" end="0"/>
+                                            </p:txEl>
+                                          </p:spTgt>
+                                        </p:tgtEl>
+                                        <p:attrNameLst>
+                                          <p:attrName>ppt_y</p:attrName>
+                                        </p:attrNameLst>
+                                      </p:cBhvr>
+                                      <p:tavLst>
+                                        <p:tav tm="0">
+                                          <p:val>
+                                            <p:strVal val="1+#ppt_h/2"/>
+                                          </p:val>
+                                        </p:tav>
+                                        <p:tav tm="100000">
+                                          <p:val>
+                                            <p:strVal val="#ppt_y"/>
+                                          </p:val>
+                                        </p:tav>
+                                      </p:tavLst>
+                                    </p:anim>
+                                  </p:childTnLst>
+                                </p:cTn>
+                              </p:par>
+                            </p:childTnLst>
+                          </p:cTn>
+                        </p:par>
+                      </p:childTnLst>
+                    </p:cTn>
+                  </p:par>
+                  <p:par>
+                    <p:cTn id="9" fill="hold">
+                      <p:stCondLst>
+                        <p:cond delay="indefinite"/>
+                      </p:stCondLst>
+                      <p:childTnLst>
+                        <p:par>
+                          <p:cTn id="10" fill="hold">
+                            <p:stCondLst>
+                              <p:cond delay="0"/>
+                            </p:stCondLst>
+                            <p:childTnLst>
+                              <p:par>
+                                <p:cTn id="11" presetID="2" presetClass="entr" presetSubtype="4" fill="hold" nodeType="clickEffect">
+                                  <p:stCondLst>
+                                    <p:cond delay="0"/>
+                                  </p:stCondLst>
+                                  <p:childTnLst>
+                                    <p:set>
+                                      <p:cBhvr>
+                                        <p:cTn id="12" dur="1" fill="hold">
+                                          <p:stCondLst>
+                                            <p:cond delay="0"/>
+                                          </p:stCondLst>
+                                        </p:cTn>
+                                        <p:tgtEl>
+                                          <p:spTgt spid="3">
+                                            <p:txEl>
+                                              <p:pRg st="1" end="1"/>
+                                            </p:txEl>
+                                          </p:spTgt>
+                                        </p:tgtEl>
+                                        <p:attrNameLst>
+                                          <p:attrName>style.visibility</p:attrName>
+                                        </p:attrNameLst>
+                                      </p:cBhvr>
+                                      <p:to>
+                                        <p:strVal val="visible"/>
+                                      </p:to>
+                                    </p:set>
+                                    <p:anim calcmode="lin" valueType="num">
+                                      <p:cBhvr additive="base">
+                                        <p:cTn id="13" dur="500" fill="hold"/>
+                                        <p:tgtEl>
+                                          <p:spTgt spid="3">
+                                            <p:txEl>
+                                              <p:pRg st="1" end="1"/>
+                                            </p:txEl>
+                                          </p:spTgt>
+                                        </p:tgtEl>
+                                        <p:attrNameLst>
+                                          <p:attrName>ppt_x</p:attrName>
+                                        </p:attrNameLst>
+                                      </p:cBhvr>
+                                      <p:tavLst>
+                                        <p:tav tm="0">
+                                          <p:val>
+                                            <p:strVal val="#ppt_x"/>
+                                          </p:val>
+                                        </p:tav>
+                                        <p:tav tm="100000">
+                                          <p:val>
+                                            <p:strVal val="#ppt_x"/>
+                                          </p:val>
+                                        </p:tav>
+                                      </p:tavLst>
+                                    </p:anim>
+                                    <p:anim calcmode="lin" valueType="num">
+                                      <p:cBhvr additive="base">
+                                        <p:cTn id="14" dur="500" fill="hold"/>
+                                        <p:tgtEl>
+                                          <p:spTgt spid="3">
+                                            <p:txEl>
+                                              <p:pRg st="1" end="1"/>
+                                            </p:txEl>
+                                          </p:spTgt>
+                                        </p:tgtEl>
+                                        <p:attrNameLst>
+                                          <p:attrName>ppt_y</p:attrName>
+                                        </p:attrNameLst>
+                                      </p:cBhvr>
+                                      <p:tavLst>
+                                        <p:tav tm="0">
+                                          <p:val>
+                                            <p:strVal val="1+#ppt_h/2"/>
+                                          </p:val>
+                                        </p:tav>
+                                        <p:tav tm="100000">
+                                          <p:val>
+                                            <p:strVal val="#ppt_y"/>
+                                          </p:val>
+                                        </p:tav>
+                                      </p:tavLst>
+                                    </p:anim>
+                                  </p:childTnLst>
+                                </p:cTn>
+                              </p:par>
+                            </p:childTnLst>
+                          </p:cTn>
+                        </p:par>
+                      </p:childTnLst>
+                    </p:cTn>
+                  </p:par>
+                </p:childTnLst>
+              </p:cTn>
+              <p:prevCondLst>
+                <p:cond evt="onPrev" delay="0">
+                  <p:tgtEl>
+                    <p:sldTgt/>
+                  </p:tgtEl>
+                </p:cond>
+              </p:prevCondLst>
+              <p:nextCondLst>
+                <p:cond evt="onNext" delay="0">
+                  <p:tgtEl>
+                    <p:sldTgt/>
+                  </p:tgtEl>
+                </p:cond>
+              </p:nextCondLst>
+            </p:seq>
+          </p:childTnLst>
+        </p:cTn>
+      </p:par>
+    </p:tnLst>
+  </p:timing>
+</p:sld>
+</file>
+
+<file path=ppt/slides/slide19.xml><?xml version="1.0" encoding="utf-8"?>
+<p:sld xmlns:a="http://schemas.openxmlformats.org/drawingml/2006/main" xmlns:r="http://schemas.openxmlformats.org/officeDocument/2006/relationships" xmlns:p="http://schemas.openxmlformats.org/presentationml/2006/main">
+  <p:cSld>
+    <p:spTree>
+      <p:nvGrpSpPr>
+        <p:cNvPr id="1" name=""/>
+        <p:cNvGrpSpPr/>
+        <p:nvPr/>
+      </p:nvGrpSpPr>
+      <p:grpSpPr>
+        <a:xfrm>
+          <a:off x="0" y="0"/>
+          <a:ext cx="0" cy="0"/>
+          <a:chOff x="0" y="0"/>
+          <a:chExt cx="0" cy="0"/>
+        </a:xfrm>
+      </p:grpSpPr>
+      <p:sp>
+        <p:nvSpPr>
+          <p:cNvPr id="3" name="Espaço Reservado para Conteúdo 2">
+            <a:extLst>
+              <a:ext uri="{FF2B5EF4-FFF2-40B4-BE49-F238E27FC236}">
+                <a16:creationId xmlns:a16="http://schemas.microsoft.com/office/drawing/2014/main" id="{1C54187F-8492-4796-96CD-9E4382E87C6F}"/>
+              </a:ext>
+            </a:extLst>
+          </p:cNvPr>
+          <p:cNvSpPr>
+            <a:spLocks noGrp="1"/>
+          </p:cNvSpPr>
+          <p:nvPr>
+            <p:ph idx="1"/>
+          </p:nvPr>
+        </p:nvSpPr>
+        <p:spPr/>
+        <p:txBody>
+          <a:bodyPr>
+            <a:normAutofit/>
+          </a:bodyPr>
+          <a:lstStyle/>
+          <a:p>
+            <a:pPr algn="just">
+              <a:buFont typeface="Wingdings" panose="05000000000000000000" pitchFamily="2" charset="2"/>
+              <a:buChar char="Ø"/>
+            </a:pPr>
+            <a:r>
+              <a:rPr lang="pt-BR" dirty="0">
+                <a:latin typeface="Arial" panose="020B0604020202020204" pitchFamily="34" charset="0"/>
+                <a:cs typeface="Arial" panose="020B0604020202020204" pitchFamily="34" charset="0"/>
+              </a:rPr>
+              <a:t>Criação</a:t>
+            </a:r>
+          </a:p>
+          <a:p>
+            <a:pPr lvl="1" algn="just"/>
+            <a:r>
+              <a:rPr lang="en-US" dirty="0" err="1">
+                <a:latin typeface="Arial" panose="020B0604020202020204" pitchFamily="34" charset="0"/>
+                <a:cs typeface="Arial" panose="020B0604020202020204" pitchFamily="34" charset="0"/>
+                <a:hlinkClick r:id="rId2">
+                  <a:extLst>
+                    <a:ext uri="{A12FA001-AC4F-418D-AE19-62706E023703}">
+                      <ahyp:hlinkClr xmlns:ahyp="http://schemas.microsoft.com/office/drawing/2018/hyperlinkcolor" val="tx"/>
+                    </a:ext>
+                  </a:extLst>
+                </a:hlinkClick>
+              </a:rPr>
+              <a:t>componentDidMount</a:t>
+            </a:r>
+            <a:r>
+              <a:rPr lang="en-US" dirty="0">
+                <a:latin typeface="Arial" panose="020B0604020202020204" pitchFamily="34" charset="0"/>
+                <a:cs typeface="Arial" panose="020B0604020202020204" pitchFamily="34" charset="0"/>
+              </a:rPr>
+              <a:t> - </a:t>
+            </a:r>
+            <a:r>
+              <a:rPr lang="pt-BR" dirty="0"/>
+              <a:t>Esse método é chamado imediatamente após a montagem do componente. Em casos que precisamos fazer alguma operação que precise de elementos do DOM, é aqui o lugar certo. Aqui também é um bom lugar para inicializarmos </a:t>
+            </a:r>
+            <a:r>
+              <a:rPr lang="pt-BR" dirty="0" err="1"/>
+              <a:t>requests</a:t>
+            </a:r>
+            <a:r>
+              <a:rPr lang="pt-BR" dirty="0"/>
+              <a:t> quando necessário.</a:t>
+            </a:r>
+            <a:endParaRPr lang="pt-BR" dirty="0">
+              <a:latin typeface="Arial" panose="020B0604020202020204" pitchFamily="34" charset="0"/>
+              <a:cs typeface="Arial" panose="020B0604020202020204" pitchFamily="34" charset="0"/>
+            </a:endParaRPr>
+          </a:p>
+        </p:txBody>
+      </p:sp>
+      <p:sp>
+        <p:nvSpPr>
+          <p:cNvPr id="6" name="Título 1">
+            <a:extLst>
+              <a:ext uri="{FF2B5EF4-FFF2-40B4-BE49-F238E27FC236}">
+                <a16:creationId xmlns:a16="http://schemas.microsoft.com/office/drawing/2014/main" id="{62E1AAE0-A067-4119-BE22-1FE8351FD147}"/>
+              </a:ext>
+            </a:extLst>
+          </p:cNvPr>
+          <p:cNvSpPr txBox="1">
+            <a:spLocks/>
+          </p:cNvSpPr>
+          <p:nvPr/>
+        </p:nvSpPr>
+        <p:spPr>
+          <a:xfrm>
+            <a:off x="0" y="122968"/>
+            <a:ext cx="12192000" cy="854430"/>
+          </a:xfrm>
+          <a:prstGeom prst="rect">
+            <a:avLst/>
+          </a:prstGeom>
+        </p:spPr>
+        <p:txBody>
+          <a:bodyPr vert="horz" lIns="91440" tIns="45720" rIns="91440" bIns="45720" rtlCol="0" anchor="ctr">
+            <a:noAutofit/>
+          </a:bodyPr>
+          <a:lstStyle>
+            <a:lvl1pPr algn="l" defTabSz="914400" rtl="0" eaLnBrk="1" latinLnBrk="0" hangingPunct="1">
+              <a:lnSpc>
+                <a:spcPct val="90000"/>
+              </a:lnSpc>
+              <a:spcBef>
+                <a:spcPct val="0"/>
+              </a:spcBef>
+              <a:buNone/>
+              <a:defRPr sz="4400" kern="1200">
+                <a:solidFill>
+                  <a:schemeClr val="tx1"/>
+                </a:solidFill>
+                <a:latin typeface="+mj-lt"/>
+                <a:ea typeface="+mj-ea"/>
+                <a:cs typeface="+mj-cs"/>
+              </a:defRPr>
+            </a:lvl1pPr>
+          </a:lstStyle>
+          <a:p>
+            <a:pPr algn="ctr"/>
+            <a:r>
+              <a:rPr lang="pt-BR" sz="4800" b="1" dirty="0">
+                <a:solidFill>
+                  <a:srgbClr val="F46524"/>
+                </a:solidFill>
+                <a:latin typeface="Arial" panose="020B0604020202020204" pitchFamily="34" charset="0"/>
+                <a:cs typeface="Arial" panose="020B0604020202020204" pitchFamily="34" charset="0"/>
+              </a:rPr>
+              <a:t>The </a:t>
+            </a:r>
+            <a:r>
+              <a:rPr lang="pt-BR" sz="4800" b="1" dirty="0" err="1">
+                <a:solidFill>
+                  <a:srgbClr val="F46524"/>
+                </a:solidFill>
+                <a:latin typeface="Arial" panose="020B0604020202020204" pitchFamily="34" charset="0"/>
+                <a:cs typeface="Arial" panose="020B0604020202020204" pitchFamily="34" charset="0"/>
+              </a:rPr>
+              <a:t>Component</a:t>
+            </a:r>
+            <a:r>
+              <a:rPr lang="pt-BR" sz="4800" b="1" dirty="0">
+                <a:solidFill>
+                  <a:srgbClr val="F46524"/>
+                </a:solidFill>
+                <a:latin typeface="Arial" panose="020B0604020202020204" pitchFamily="34" charset="0"/>
+                <a:cs typeface="Arial" panose="020B0604020202020204" pitchFamily="34" charset="0"/>
+              </a:rPr>
+              <a:t> </a:t>
+            </a:r>
+            <a:r>
+              <a:rPr lang="pt-BR" sz="4800" b="1" dirty="0" err="1">
+                <a:solidFill>
+                  <a:srgbClr val="F46524"/>
+                </a:solidFill>
+                <a:latin typeface="Arial" panose="020B0604020202020204" pitchFamily="34" charset="0"/>
+                <a:cs typeface="Arial" panose="020B0604020202020204" pitchFamily="34" charset="0"/>
+              </a:rPr>
+              <a:t>Lifecycle</a:t>
+            </a:r>
+            <a:endParaRPr lang="pt-BR" sz="4800" b="1" dirty="0">
+              <a:solidFill>
+                <a:srgbClr val="F46524"/>
+              </a:solidFill>
+              <a:latin typeface="Arial" panose="020B0604020202020204" pitchFamily="34" charset="0"/>
+              <a:cs typeface="Arial" panose="020B0604020202020204" pitchFamily="34" charset="0"/>
+            </a:endParaRPr>
+          </a:p>
+        </p:txBody>
+      </p:sp>
+      <p:pic>
+        <p:nvPicPr>
+          <p:cNvPr id="7" name="Imagem 6">
+            <a:extLst>
+              <a:ext uri="{FF2B5EF4-FFF2-40B4-BE49-F238E27FC236}">
+                <a16:creationId xmlns:a16="http://schemas.microsoft.com/office/drawing/2014/main" id="{4E6DF7A4-AA0F-4323-8CC2-D016FEA6DF7B}"/>
+              </a:ext>
+            </a:extLst>
+          </p:cNvPr>
+          <p:cNvPicPr>
+            <a:picLocks noChangeAspect="1"/>
+          </p:cNvPicPr>
+          <p:nvPr/>
+        </p:nvPicPr>
+        <p:blipFill>
+          <a:blip r:embed="rId3"/>
+          <a:stretch>
+            <a:fillRect/>
+          </a:stretch>
+        </p:blipFill>
+        <p:spPr>
+          <a:xfrm>
+            <a:off x="10258887" y="122968"/>
+            <a:ext cx="1447800" cy="790575"/>
+          </a:xfrm>
+          <a:prstGeom prst="rect">
+            <a:avLst/>
+          </a:prstGeom>
+        </p:spPr>
+      </p:pic>
+      <p:pic>
+        <p:nvPicPr>
+          <p:cNvPr id="8" name="Imagem 7">
+            <a:extLst>
+              <a:ext uri="{FF2B5EF4-FFF2-40B4-BE49-F238E27FC236}">
+                <a16:creationId xmlns:a16="http://schemas.microsoft.com/office/drawing/2014/main" id="{4A328260-2ADB-4693-9112-53AB287FD66C}"/>
+              </a:ext>
+            </a:extLst>
+          </p:cNvPr>
+          <p:cNvPicPr>
+            <a:picLocks noChangeAspect="1"/>
+          </p:cNvPicPr>
+          <p:nvPr/>
+        </p:nvPicPr>
+        <p:blipFill>
+          <a:blip r:embed="rId4"/>
+          <a:stretch>
+            <a:fillRect/>
+          </a:stretch>
+        </p:blipFill>
+        <p:spPr>
+          <a:xfrm>
+            <a:off x="0" y="0"/>
+            <a:ext cx="1419225" cy="1495425"/>
+          </a:xfrm>
+          <a:prstGeom prst="rect">
+            <a:avLst/>
+          </a:prstGeom>
+        </p:spPr>
+      </p:pic>
+    </p:spTree>
+    <p:extLst>
+      <p:ext uri="{BB962C8B-B14F-4D97-AF65-F5344CB8AC3E}">
+        <p14:creationId xmlns:p14="http://schemas.microsoft.com/office/powerpoint/2010/main" val="296331853"/>
+      </p:ext>
+    </p:extLst>
+  </p:cSld>
+  <p:clrMapOvr>
+    <a:masterClrMapping/>
+  </p:clrMapOvr>
+  <p:timing>
+    <p:tnLst>
+      <p:par>
+        <p:cTn id="1" dur="indefinite" restart="never" nodeType="tmRoot">
+          <p:childTnLst>
+            <p:seq concurrent="1" nextAc="seek">
+              <p:cTn id="2" dur="indefinite" nodeType="mainSeq">
+                <p:childTnLst>
+                  <p:par>
+                    <p:cTn id="3" fill="hold">
+                      <p:stCondLst>
+                        <p:cond delay="indefinite"/>
+                      </p:stCondLst>
+                      <p:childTnLst>
+                        <p:par>
+                          <p:cTn id="4" fill="hold">
+                            <p:stCondLst>
+                              <p:cond delay="0"/>
+                            </p:stCondLst>
+                            <p:childTnLst>
+                              <p:par>
+                                <p:cTn id="5" presetID="2" presetClass="entr" presetSubtype="4" fill="hold" nodeType="clickEffect">
+                                  <p:stCondLst>
+                                    <p:cond delay="0"/>
+                                  </p:stCondLst>
+                                  <p:childTnLst>
+                                    <p:set>
+                                      <p:cBhvr>
+                                        <p:cTn id="6" dur="1" fill="hold">
+                                          <p:stCondLst>
+                                            <p:cond delay="0"/>
+                                          </p:stCondLst>
+                                        </p:cTn>
+                                        <p:tgtEl>
+                                          <p:spTgt spid="3">
+                                            <p:txEl>
+                                              <p:pRg st="0" end="0"/>
+                                            </p:txEl>
+                                          </p:spTgt>
+                                        </p:tgtEl>
+                                        <p:attrNameLst>
+                                          <p:attrName>style.visibility</p:attrName>
+                                        </p:attrNameLst>
+                                      </p:cBhvr>
+                                      <p:to>
+                                        <p:strVal val="visible"/>
+                                      </p:to>
+                                    </p:set>
+                                    <p:anim calcmode="lin" valueType="num">
+                                      <p:cBhvr additive="base">
+                                        <p:cTn id="7" dur="500" fill="hold"/>
+                                        <p:tgtEl>
+                                          <p:spTgt spid="3">
+                                            <p:txEl>
+                                              <p:pRg st="0" end="0"/>
+                                            </p:txEl>
+                                          </p:spTgt>
+                                        </p:tgtEl>
+                                        <p:attrNameLst>
+                                          <p:attrName>ppt_x</p:attrName>
+                                        </p:attrNameLst>
+                                      </p:cBhvr>
+                                      <p:tavLst>
+                                        <p:tav tm="0">
+                                          <p:val>
+                                            <p:strVal val="#ppt_x"/>
+                                          </p:val>
+                                        </p:tav>
+                                        <p:tav tm="100000">
+                                          <p:val>
+                                            <p:strVal val="#ppt_x"/>
+                                          </p:val>
+                                        </p:tav>
+                                      </p:tavLst>
+                                    </p:anim>
+                                    <p:anim calcmode="lin" valueType="num">
+                                      <p:cBhvr additive="base">
+                                        <p:cTn id="8" dur="500" fill="hold"/>
+                                        <p:tgtEl>
+                                          <p:spTgt spid="3">
+                                            <p:txEl>
+                                              <p:pRg st="0" end="0"/>
+                                            </p:txEl>
+                                          </p:spTgt>
+                                        </p:tgtEl>
+                                        <p:attrNameLst>
+                                          <p:attrName>ppt_y</p:attrName>
+                                        </p:attrNameLst>
+                                      </p:cBhvr>
+                                      <p:tavLst>
+                                        <p:tav tm="0">
+                                          <p:val>
+                                            <p:strVal val="1+#ppt_h/2"/>
+                                          </p:val>
+                                        </p:tav>
+                                        <p:tav tm="100000">
+                                          <p:val>
+                                            <p:strVal val="#ppt_y"/>
+                                          </p:val>
+                                        </p:tav>
+                                      </p:tavLst>
+                                    </p:anim>
+                                  </p:childTnLst>
+                                </p:cTn>
+                              </p:par>
+                            </p:childTnLst>
+                          </p:cTn>
+                        </p:par>
+                      </p:childTnLst>
+                    </p:cTn>
+                  </p:par>
+                  <p:par>
+                    <p:cTn id="9" fill="hold">
+                      <p:stCondLst>
+                        <p:cond delay="indefinite"/>
+                      </p:stCondLst>
+                      <p:childTnLst>
+                        <p:par>
+                          <p:cTn id="10" fill="hold">
+                            <p:stCondLst>
+                              <p:cond delay="0"/>
+                            </p:stCondLst>
+                            <p:childTnLst>
+                              <p:par>
+                                <p:cTn id="11" presetID="2" presetClass="entr" presetSubtype="4" fill="hold" nodeType="clickEffect">
+                                  <p:stCondLst>
+                                    <p:cond delay="0"/>
+                                  </p:stCondLst>
+                                  <p:childTnLst>
+                                    <p:set>
+                                      <p:cBhvr>
+                                        <p:cTn id="12" dur="1" fill="hold">
+                                          <p:stCondLst>
+                                            <p:cond delay="0"/>
+                                          </p:stCondLst>
+                                        </p:cTn>
+                                        <p:tgtEl>
+                                          <p:spTgt spid="3">
+                                            <p:txEl>
+                                              <p:pRg st="1" end="1"/>
+                                            </p:txEl>
+                                          </p:spTgt>
+                                        </p:tgtEl>
+                                        <p:attrNameLst>
+                                          <p:attrName>style.visibility</p:attrName>
+                                        </p:attrNameLst>
+                                      </p:cBhvr>
+                                      <p:to>
+                                        <p:strVal val="visible"/>
+                                      </p:to>
+                                    </p:set>
+                                    <p:anim calcmode="lin" valueType="num">
+                                      <p:cBhvr additive="base">
+                                        <p:cTn id="13" dur="500" fill="hold"/>
+                                        <p:tgtEl>
+                                          <p:spTgt spid="3">
+                                            <p:txEl>
+                                              <p:pRg st="1" end="1"/>
+                                            </p:txEl>
+                                          </p:spTgt>
+                                        </p:tgtEl>
+                                        <p:attrNameLst>
+                                          <p:attrName>ppt_x</p:attrName>
+                                        </p:attrNameLst>
+                                      </p:cBhvr>
+                                      <p:tavLst>
+                                        <p:tav tm="0">
+                                          <p:val>
+                                            <p:strVal val="#ppt_x"/>
+                                          </p:val>
+                                        </p:tav>
+                                        <p:tav tm="100000">
+                                          <p:val>
+                                            <p:strVal val="#ppt_x"/>
+                                          </p:val>
+                                        </p:tav>
+                                      </p:tavLst>
+                                    </p:anim>
+                                    <p:anim calcmode="lin" valueType="num">
+                                      <p:cBhvr additive="base">
+                                        <p:cTn id="14" dur="500" fill="hold"/>
+                                        <p:tgtEl>
+                                          <p:spTgt spid="3">
+                                            <p:txEl>
+                                              <p:pRg st="1" end="1"/>
+                                            </p:txEl>
+                                          </p:spTgt>
+                                        </p:tgtEl>
+                                        <p:attrNameLst>
+                                          <p:attrName>ppt_y</p:attrName>
+                                        </p:attrNameLst>
+                                      </p:cBhvr>
+                                      <p:tavLst>
+                                        <p:tav tm="0">
+                                          <p:val>
+                                            <p:strVal val="1+#ppt_h/2"/>
+                                          </p:val>
+                                        </p:tav>
+                                        <p:tav tm="100000">
+                                          <p:val>
+                                            <p:strVal val="#ppt_y"/>
+                                          </p:val>
+                                        </p:tav>
+                                      </p:tavLst>
+                                    </p:anim>
+                                  </p:childTnLst>
+                                </p:cTn>
+                              </p:par>
+                            </p:childTnLst>
+                          </p:cTn>
+                        </p:par>
+                      </p:childTnLst>
+                    </p:cTn>
+                  </p:par>
+                </p:childTnLst>
+              </p:cTn>
+              <p:prevCondLst>
+                <p:cond evt="onPrev" delay="0">
+                  <p:tgtEl>
+                    <p:sldTgt/>
+                  </p:tgtEl>
+                </p:cond>
+              </p:prevCondLst>
+              <p:nextCondLst>
+                <p:cond evt="onNext" delay="0">
+                  <p:tgtEl>
+                    <p:sldTgt/>
+                  </p:tgtEl>
+                </p:cond>
+              </p:nextCondLst>
+            </p:seq>
+          </p:childTnLst>
+        </p:cTn>
+      </p:par>
+    </p:tnLst>
+  </p:timing>
 </p:sld>
 </file>
 
@@ -7327,6 +9315,706 @@
       <p:bldP spid="3" grpId="0" build="p"/>
     </p:bldLst>
   </p:timing>
+</p:sld>
+</file>
+
+<file path=ppt/slides/slide20.xml><?xml version="1.0" encoding="utf-8"?>
+<p:sld xmlns:a="http://schemas.openxmlformats.org/drawingml/2006/main" xmlns:r="http://schemas.openxmlformats.org/officeDocument/2006/relationships" xmlns:p="http://schemas.openxmlformats.org/presentationml/2006/main">
+  <p:cSld>
+    <p:spTree>
+      <p:nvGrpSpPr>
+        <p:cNvPr id="1" name=""/>
+        <p:cNvGrpSpPr/>
+        <p:nvPr/>
+      </p:nvGrpSpPr>
+      <p:grpSpPr>
+        <a:xfrm>
+          <a:off x="0" y="0"/>
+          <a:ext cx="0" cy="0"/>
+          <a:chOff x="0" y="0"/>
+          <a:chExt cx="0" cy="0"/>
+        </a:xfrm>
+      </p:grpSpPr>
+      <p:sp>
+        <p:nvSpPr>
+          <p:cNvPr id="3" name="Espaço Reservado para Conteúdo 2">
+            <a:extLst>
+              <a:ext uri="{FF2B5EF4-FFF2-40B4-BE49-F238E27FC236}">
+                <a16:creationId xmlns:a16="http://schemas.microsoft.com/office/drawing/2014/main" id="{1AAB47FC-6C28-4E71-B466-6E4AC797B104}"/>
+              </a:ext>
+            </a:extLst>
+          </p:cNvPr>
+          <p:cNvSpPr>
+            <a:spLocks noGrp="1"/>
+          </p:cNvSpPr>
+          <p:nvPr>
+            <p:ph idx="1"/>
+          </p:nvPr>
+        </p:nvSpPr>
+        <p:spPr>
+          <a:xfrm>
+            <a:off x="838200" y="1825625"/>
+            <a:ext cx="10515600" cy="4956916"/>
+          </a:xfrm>
+        </p:spPr>
+        <p:txBody>
+          <a:bodyPr>
+            <a:normAutofit/>
+          </a:bodyPr>
+          <a:lstStyle/>
+          <a:p>
+            <a:pPr marL="1371600" lvl="3" indent="0">
+              <a:buNone/>
+            </a:pPr>
+            <a:r>
+              <a:rPr lang="pt-BR" sz="2800" dirty="0">
+                <a:latin typeface="Arial" panose="020B0604020202020204" pitchFamily="34" charset="0"/>
+                <a:cs typeface="Arial" panose="020B0604020202020204" pitchFamily="34" charset="0"/>
+              </a:rPr>
+              <a:t>Visual Studio </a:t>
+            </a:r>
+            <a:r>
+              <a:rPr lang="pt-BR" sz="2800" dirty="0" err="1">
+                <a:latin typeface="Arial" panose="020B0604020202020204" pitchFamily="34" charset="0"/>
+                <a:cs typeface="Arial" panose="020B0604020202020204" pitchFamily="34" charset="0"/>
+              </a:rPr>
+              <a:t>Code</a:t>
+            </a:r>
+            <a:endParaRPr lang="pt-BR" sz="2800" dirty="0">
+              <a:latin typeface="Arial" panose="020B0604020202020204" pitchFamily="34" charset="0"/>
+              <a:cs typeface="Arial" panose="020B0604020202020204" pitchFamily="34" charset="0"/>
+            </a:endParaRPr>
+          </a:p>
+          <a:p>
+            <a:pPr lvl="3"/>
+            <a:r>
+              <a:rPr lang="pt-BR" sz="2800" dirty="0">
+                <a:latin typeface="Arial" panose="020B0604020202020204" pitchFamily="34" charset="0"/>
+                <a:cs typeface="Arial" panose="020B0604020202020204" pitchFamily="34" charset="0"/>
+                <a:hlinkClick r:id="rId2"/>
+              </a:rPr>
+              <a:t>https://code.visualstudio.com/</a:t>
+            </a:r>
+            <a:endParaRPr lang="pt-BR" sz="2800" dirty="0">
+              <a:latin typeface="Arial" panose="020B0604020202020204" pitchFamily="34" charset="0"/>
+              <a:cs typeface="Arial" panose="020B0604020202020204" pitchFamily="34" charset="0"/>
+            </a:endParaRPr>
+          </a:p>
+          <a:p>
+            <a:pPr lvl="2"/>
+            <a:endParaRPr lang="pt-BR" sz="2800" dirty="0">
+              <a:latin typeface="Arial" panose="020B0604020202020204" pitchFamily="34" charset="0"/>
+              <a:cs typeface="Arial" panose="020B0604020202020204" pitchFamily="34" charset="0"/>
+            </a:endParaRPr>
+          </a:p>
+          <a:p>
+            <a:pPr marL="1371600" lvl="3" indent="0">
+              <a:buNone/>
+            </a:pPr>
+            <a:r>
+              <a:rPr lang="pt-BR" sz="2800" dirty="0">
+                <a:latin typeface="Arial" panose="020B0604020202020204" pitchFamily="34" charset="0"/>
+                <a:cs typeface="Arial" panose="020B0604020202020204" pitchFamily="34" charset="0"/>
+              </a:rPr>
+              <a:t>Node  v8.x</a:t>
+            </a:r>
+          </a:p>
+          <a:p>
+            <a:pPr lvl="3"/>
+            <a:r>
+              <a:rPr lang="pt-BR" sz="2800" dirty="0">
+                <a:latin typeface="Arial" panose="020B0604020202020204" pitchFamily="34" charset="0"/>
+                <a:cs typeface="Arial" panose="020B0604020202020204" pitchFamily="34" charset="0"/>
+                <a:hlinkClick r:id="rId3"/>
+              </a:rPr>
+              <a:t>https://nodejs.org/en/</a:t>
+            </a:r>
+            <a:endParaRPr lang="pt-BR" sz="2800" dirty="0">
+              <a:latin typeface="Arial" panose="020B0604020202020204" pitchFamily="34" charset="0"/>
+              <a:cs typeface="Arial" panose="020B0604020202020204" pitchFamily="34" charset="0"/>
+            </a:endParaRPr>
+          </a:p>
+          <a:p>
+            <a:pPr marL="1371600" lvl="3" indent="0">
+              <a:buNone/>
+            </a:pPr>
+            <a:endParaRPr lang="pt-BR" sz="2800" dirty="0">
+              <a:latin typeface="Arial" panose="020B0604020202020204" pitchFamily="34" charset="0"/>
+              <a:cs typeface="Arial" panose="020B0604020202020204" pitchFamily="34" charset="0"/>
+            </a:endParaRPr>
+          </a:p>
+          <a:p>
+            <a:pPr marL="1371600" lvl="3" indent="0">
+              <a:buNone/>
+            </a:pPr>
+            <a:r>
+              <a:rPr lang="pt-BR" sz="2800" dirty="0" err="1">
+                <a:latin typeface="Arial" panose="020B0604020202020204" pitchFamily="34" charset="0"/>
+                <a:cs typeface="Arial" panose="020B0604020202020204" pitchFamily="34" charset="0"/>
+              </a:rPr>
+              <a:t>Yarn</a:t>
+            </a:r>
+            <a:endParaRPr lang="pt-BR" sz="2800" dirty="0">
+              <a:latin typeface="Arial" panose="020B0604020202020204" pitchFamily="34" charset="0"/>
+              <a:cs typeface="Arial" panose="020B0604020202020204" pitchFamily="34" charset="0"/>
+            </a:endParaRPr>
+          </a:p>
+          <a:p>
+            <a:pPr marL="1371600" lvl="3" indent="0">
+              <a:buNone/>
+            </a:pPr>
+            <a:r>
+              <a:rPr lang="pt-BR" sz="2800" dirty="0">
+                <a:latin typeface="Arial" panose="020B0604020202020204" pitchFamily="34" charset="0"/>
+                <a:cs typeface="Arial" panose="020B0604020202020204" pitchFamily="34" charset="0"/>
+              </a:rPr>
+              <a:t>https://yarnpkg.com/en/</a:t>
+            </a:r>
+          </a:p>
+        </p:txBody>
+      </p:sp>
+      <p:pic>
+        <p:nvPicPr>
+          <p:cNvPr id="5" name="Imagem 4">
+            <a:extLst>
+              <a:ext uri="{FF2B5EF4-FFF2-40B4-BE49-F238E27FC236}">
+                <a16:creationId xmlns:a16="http://schemas.microsoft.com/office/drawing/2014/main" id="{1980853C-3337-45DD-B93F-291A0DC92A1A}"/>
+              </a:ext>
+            </a:extLst>
+          </p:cNvPr>
+          <p:cNvPicPr>
+            <a:picLocks noChangeAspect="1"/>
+          </p:cNvPicPr>
+          <p:nvPr/>
+        </p:nvPicPr>
+        <p:blipFill>
+          <a:blip r:embed="rId4">
+            <a:extLst>
+              <a:ext uri="{28A0092B-C50C-407E-A947-70E740481C1C}">
+                <a14:useLocalDpi xmlns:a14="http://schemas.microsoft.com/office/drawing/2010/main" val="0"/>
+              </a:ext>
+            </a:extLst>
+          </a:blip>
+          <a:stretch>
+            <a:fillRect/>
+          </a:stretch>
+        </p:blipFill>
+        <p:spPr>
+          <a:xfrm>
+            <a:off x="1089081" y="1810489"/>
+            <a:ext cx="836420" cy="833283"/>
+          </a:xfrm>
+          <a:prstGeom prst="rect">
+            <a:avLst/>
+          </a:prstGeom>
+        </p:spPr>
+      </p:pic>
+      <p:pic>
+        <p:nvPicPr>
+          <p:cNvPr id="7" name="Imagem 6">
+            <a:extLst>
+              <a:ext uri="{FF2B5EF4-FFF2-40B4-BE49-F238E27FC236}">
+                <a16:creationId xmlns:a16="http://schemas.microsoft.com/office/drawing/2014/main" id="{2D6F34DB-D420-435C-9272-D07FFA6883AC}"/>
+              </a:ext>
+            </a:extLst>
+          </p:cNvPr>
+          <p:cNvPicPr>
+            <a:picLocks noChangeAspect="1"/>
+          </p:cNvPicPr>
+          <p:nvPr/>
+        </p:nvPicPr>
+        <p:blipFill>
+          <a:blip r:embed="rId5">
+            <a:extLst>
+              <a:ext uri="{28A0092B-C50C-407E-A947-70E740481C1C}">
+                <a14:useLocalDpi xmlns:a14="http://schemas.microsoft.com/office/drawing/2010/main" val="0"/>
+              </a:ext>
+            </a:extLst>
+          </a:blip>
+          <a:stretch>
+            <a:fillRect/>
+          </a:stretch>
+        </p:blipFill>
+        <p:spPr>
+          <a:xfrm>
+            <a:off x="838200" y="3185592"/>
+            <a:ext cx="1092237" cy="669091"/>
+          </a:xfrm>
+          <a:prstGeom prst="rect">
+            <a:avLst/>
+          </a:prstGeom>
+        </p:spPr>
+      </p:pic>
+      <p:sp>
+        <p:nvSpPr>
+          <p:cNvPr id="8" name="Título 1">
+            <a:extLst>
+              <a:ext uri="{FF2B5EF4-FFF2-40B4-BE49-F238E27FC236}">
+                <a16:creationId xmlns:a16="http://schemas.microsoft.com/office/drawing/2014/main" id="{B3BEFC02-D129-4D1F-BF87-57E82425225E}"/>
+              </a:ext>
+            </a:extLst>
+          </p:cNvPr>
+          <p:cNvSpPr txBox="1">
+            <a:spLocks/>
+          </p:cNvSpPr>
+          <p:nvPr/>
+        </p:nvSpPr>
+        <p:spPr>
+          <a:xfrm>
+            <a:off x="-97654" y="122968"/>
+            <a:ext cx="12289654" cy="854430"/>
+          </a:xfrm>
+          <a:prstGeom prst="rect">
+            <a:avLst/>
+          </a:prstGeom>
+        </p:spPr>
+        <p:txBody>
+          <a:bodyPr vert="horz" lIns="91440" tIns="45720" rIns="91440" bIns="45720" rtlCol="0" anchor="ctr">
+            <a:noAutofit/>
+          </a:bodyPr>
+          <a:lstStyle>
+            <a:lvl1pPr algn="l" defTabSz="914400" rtl="0" eaLnBrk="1" latinLnBrk="0" hangingPunct="1">
+              <a:lnSpc>
+                <a:spcPct val="90000"/>
+              </a:lnSpc>
+              <a:spcBef>
+                <a:spcPct val="0"/>
+              </a:spcBef>
+              <a:buNone/>
+              <a:defRPr sz="4400" kern="1200">
+                <a:solidFill>
+                  <a:schemeClr val="tx1"/>
+                </a:solidFill>
+                <a:latin typeface="+mj-lt"/>
+                <a:ea typeface="+mj-ea"/>
+                <a:cs typeface="+mj-cs"/>
+              </a:defRPr>
+            </a:lvl1pPr>
+          </a:lstStyle>
+          <a:p>
+            <a:pPr algn="ctr"/>
+            <a:r>
+              <a:rPr lang="pt-BR" sz="5400" b="1" dirty="0">
+                <a:solidFill>
+                  <a:srgbClr val="F46524"/>
+                </a:solidFill>
+                <a:latin typeface="Arial" panose="020B0604020202020204" pitchFamily="34" charset="0"/>
+                <a:cs typeface="Arial" panose="020B0604020202020204" pitchFamily="34" charset="0"/>
+              </a:rPr>
+              <a:t>Ferramentas de trabalho</a:t>
+            </a:r>
+          </a:p>
+        </p:txBody>
+      </p:sp>
+      <p:pic>
+        <p:nvPicPr>
+          <p:cNvPr id="10" name="Imagem 9">
+            <a:extLst>
+              <a:ext uri="{FF2B5EF4-FFF2-40B4-BE49-F238E27FC236}">
+                <a16:creationId xmlns:a16="http://schemas.microsoft.com/office/drawing/2014/main" id="{84D279C7-1C06-4004-9991-A13A3190FD61}"/>
+              </a:ext>
+            </a:extLst>
+          </p:cNvPr>
+          <p:cNvPicPr>
+            <a:picLocks noChangeAspect="1"/>
+          </p:cNvPicPr>
+          <p:nvPr/>
+        </p:nvPicPr>
+        <p:blipFill>
+          <a:blip r:embed="rId6"/>
+          <a:stretch>
+            <a:fillRect/>
+          </a:stretch>
+        </p:blipFill>
+        <p:spPr>
+          <a:xfrm>
+            <a:off x="10258887" y="122968"/>
+            <a:ext cx="1447800" cy="790575"/>
+          </a:xfrm>
+          <a:prstGeom prst="rect">
+            <a:avLst/>
+          </a:prstGeom>
+        </p:spPr>
+      </p:pic>
+      <p:pic>
+        <p:nvPicPr>
+          <p:cNvPr id="11" name="Imagem 10">
+            <a:extLst>
+              <a:ext uri="{FF2B5EF4-FFF2-40B4-BE49-F238E27FC236}">
+                <a16:creationId xmlns:a16="http://schemas.microsoft.com/office/drawing/2014/main" id="{F0A6D002-2C9E-4769-993E-9B276F082CBC}"/>
+              </a:ext>
+            </a:extLst>
+          </p:cNvPr>
+          <p:cNvPicPr>
+            <a:picLocks noChangeAspect="1"/>
+          </p:cNvPicPr>
+          <p:nvPr/>
+        </p:nvPicPr>
+        <p:blipFill>
+          <a:blip r:embed="rId7"/>
+          <a:stretch>
+            <a:fillRect/>
+          </a:stretch>
+        </p:blipFill>
+        <p:spPr>
+          <a:xfrm>
+            <a:off x="0" y="0"/>
+            <a:ext cx="1419225" cy="1495425"/>
+          </a:xfrm>
+          <a:prstGeom prst="rect">
+            <a:avLst/>
+          </a:prstGeom>
+        </p:spPr>
+      </p:pic>
+      <p:pic>
+        <p:nvPicPr>
+          <p:cNvPr id="2" name="Imagem 1">
+            <a:extLst>
+              <a:ext uri="{FF2B5EF4-FFF2-40B4-BE49-F238E27FC236}">
+                <a16:creationId xmlns:a16="http://schemas.microsoft.com/office/drawing/2014/main" id="{7904EF82-1730-42B3-B311-F920770011E4}"/>
+              </a:ext>
+            </a:extLst>
+          </p:cNvPr>
+          <p:cNvPicPr>
+            <a:picLocks noChangeAspect="1"/>
+          </p:cNvPicPr>
+          <p:nvPr/>
+        </p:nvPicPr>
+        <p:blipFill>
+          <a:blip r:embed="rId8"/>
+          <a:stretch>
+            <a:fillRect/>
+          </a:stretch>
+        </p:blipFill>
+        <p:spPr>
+          <a:xfrm>
+            <a:off x="689916" y="4396503"/>
+            <a:ext cx="1458618" cy="669091"/>
+          </a:xfrm>
+          <a:prstGeom prst="rect">
+            <a:avLst/>
+          </a:prstGeom>
+        </p:spPr>
+      </p:pic>
+    </p:spTree>
+    <p:extLst>
+      <p:ext uri="{BB962C8B-B14F-4D97-AF65-F5344CB8AC3E}">
+        <p14:creationId xmlns:p14="http://schemas.microsoft.com/office/powerpoint/2010/main" val="46393853"/>
+      </p:ext>
+    </p:extLst>
+  </p:cSld>
+  <p:clrMapOvr>
+    <a:masterClrMapping/>
+  </p:clrMapOvr>
+</p:sld>
+</file>
+
+<file path=ppt/slides/slide21.xml><?xml version="1.0" encoding="utf-8"?>
+<p:sld xmlns:a="http://schemas.openxmlformats.org/drawingml/2006/main" xmlns:r="http://schemas.openxmlformats.org/officeDocument/2006/relationships" xmlns:p="http://schemas.openxmlformats.org/presentationml/2006/main">
+  <p:cSld>
+    <p:spTree>
+      <p:nvGrpSpPr>
+        <p:cNvPr id="1" name=""/>
+        <p:cNvGrpSpPr/>
+        <p:nvPr/>
+      </p:nvGrpSpPr>
+      <p:grpSpPr>
+        <a:xfrm>
+          <a:off x="0" y="0"/>
+          <a:ext cx="0" cy="0"/>
+          <a:chOff x="0" y="0"/>
+          <a:chExt cx="0" cy="0"/>
+        </a:xfrm>
+      </p:grpSpPr>
+      <p:sp>
+        <p:nvSpPr>
+          <p:cNvPr id="3" name="Espaço Reservado para Conteúdo 2">
+            <a:extLst>
+              <a:ext uri="{FF2B5EF4-FFF2-40B4-BE49-F238E27FC236}">
+                <a16:creationId xmlns:a16="http://schemas.microsoft.com/office/drawing/2014/main" id="{E314484E-A931-4CA1-9026-C6C88FF7498E}"/>
+              </a:ext>
+            </a:extLst>
+          </p:cNvPr>
+          <p:cNvSpPr>
+            <a:spLocks noGrp="1"/>
+          </p:cNvSpPr>
+          <p:nvPr>
+            <p:ph idx="1"/>
+          </p:nvPr>
+        </p:nvSpPr>
+        <p:spPr/>
+        <p:txBody>
+          <a:bodyPr/>
+          <a:lstStyle/>
+          <a:p>
+            <a:pPr>
+              <a:buFont typeface="Wingdings" panose="05000000000000000000" pitchFamily="2" charset="2"/>
+              <a:buChar char="ü"/>
+            </a:pPr>
+            <a:r>
+              <a:rPr lang="pt-BR" dirty="0">
+                <a:latin typeface="Arial" panose="020B0604020202020204" pitchFamily="34" charset="0"/>
+                <a:cs typeface="Arial" panose="020B0604020202020204" pitchFamily="34" charset="0"/>
+              </a:rPr>
+              <a:t>https://reactjs.org/</a:t>
+            </a:r>
+          </a:p>
+          <a:p>
+            <a:pPr>
+              <a:buFont typeface="Wingdings" panose="05000000000000000000" pitchFamily="2" charset="2"/>
+              <a:buChar char="ü"/>
+            </a:pPr>
+            <a:r>
+              <a:rPr lang="pt-BR" dirty="0">
+                <a:latin typeface="Arial" panose="020B0604020202020204" pitchFamily="34" charset="0"/>
+                <a:cs typeface="Arial" panose="020B0604020202020204" pitchFamily="34" charset="0"/>
+                <a:hlinkClick r:id="rId2"/>
+              </a:rPr>
+              <a:t>https://medium.com/by-vinicius-reis/o-que-e-react-ng2-auleria-vue-e34b0c77b5a1</a:t>
+            </a:r>
+            <a:endParaRPr lang="pt-BR" dirty="0">
+              <a:latin typeface="Arial" panose="020B0604020202020204" pitchFamily="34" charset="0"/>
+              <a:cs typeface="Arial" panose="020B0604020202020204" pitchFamily="34" charset="0"/>
+            </a:endParaRPr>
+          </a:p>
+          <a:p>
+            <a:pPr>
+              <a:buFont typeface="Wingdings" panose="05000000000000000000" pitchFamily="2" charset="2"/>
+              <a:buChar char="ü"/>
+            </a:pPr>
+            <a:r>
+              <a:rPr lang="pt-BR" dirty="0">
+                <a:latin typeface="Arial" panose="020B0604020202020204" pitchFamily="34" charset="0"/>
+                <a:cs typeface="Arial" panose="020B0604020202020204" pitchFamily="34" charset="0"/>
+                <a:hlinkClick r:id="rId3"/>
+              </a:rPr>
+              <a:t>https://gabrielsobrinho.com/introducao-ao-react-js/</a:t>
+            </a:r>
+            <a:endParaRPr lang="pt-BR" dirty="0">
+              <a:latin typeface="Arial" panose="020B0604020202020204" pitchFamily="34" charset="0"/>
+              <a:cs typeface="Arial" panose="020B0604020202020204" pitchFamily="34" charset="0"/>
+            </a:endParaRPr>
+          </a:p>
+          <a:p>
+            <a:pPr>
+              <a:buFont typeface="Wingdings" panose="05000000000000000000" pitchFamily="2" charset="2"/>
+              <a:buChar char="ü"/>
+            </a:pPr>
+            <a:r>
+              <a:rPr lang="pt-BR" dirty="0">
+                <a:latin typeface="Arial" panose="020B0604020202020204" pitchFamily="34" charset="0"/>
+                <a:cs typeface="Arial" panose="020B0604020202020204" pitchFamily="34" charset="0"/>
+                <a:hlinkClick r:id="rId4"/>
+              </a:rPr>
+              <a:t>https://medium.com/reactbrasil/jsx-de6f43b06f41</a:t>
+            </a:r>
+            <a:endParaRPr lang="pt-BR" dirty="0">
+              <a:latin typeface="Arial" panose="020B0604020202020204" pitchFamily="34" charset="0"/>
+              <a:cs typeface="Arial" panose="020B0604020202020204" pitchFamily="34" charset="0"/>
+            </a:endParaRPr>
+          </a:p>
+          <a:p>
+            <a:pPr>
+              <a:buFont typeface="Wingdings" panose="05000000000000000000" pitchFamily="2" charset="2"/>
+              <a:buChar char="ü"/>
+            </a:pPr>
+            <a:r>
+              <a:rPr lang="pt-BR" dirty="0">
+                <a:latin typeface="Arial" panose="020B0604020202020204" pitchFamily="34" charset="0"/>
+                <a:cs typeface="Arial" panose="020B0604020202020204" pitchFamily="34" charset="0"/>
+                <a:hlinkClick r:id="rId5"/>
+              </a:rPr>
+              <a:t>https://www.w3schools.com/howto/howto_css_animate_buttons.asp</a:t>
+            </a:r>
+            <a:endParaRPr lang="pt-BR" dirty="0">
+              <a:latin typeface="Arial" panose="020B0604020202020204" pitchFamily="34" charset="0"/>
+              <a:cs typeface="Arial" panose="020B0604020202020204" pitchFamily="34" charset="0"/>
+            </a:endParaRPr>
+          </a:p>
+          <a:p>
+            <a:pPr>
+              <a:buFont typeface="Wingdings" panose="05000000000000000000" pitchFamily="2" charset="2"/>
+              <a:buChar char="ü"/>
+            </a:pPr>
+            <a:r>
+              <a:rPr lang="pt-BR" dirty="0">
+                <a:latin typeface="Arial" panose="020B0604020202020204" pitchFamily="34" charset="0"/>
+                <a:cs typeface="Arial" panose="020B0604020202020204" pitchFamily="34" charset="0"/>
+                <a:hlinkClick r:id="rId6"/>
+              </a:rPr>
+              <a:t>https://reactjs.org/docs/fragments.html</a:t>
+            </a:r>
+            <a:endParaRPr lang="pt-BR" dirty="0">
+              <a:latin typeface="Arial" panose="020B0604020202020204" pitchFamily="34" charset="0"/>
+              <a:cs typeface="Arial" panose="020B0604020202020204" pitchFamily="34" charset="0"/>
+            </a:endParaRPr>
+          </a:p>
+          <a:p>
+            <a:pPr>
+              <a:buFont typeface="Wingdings" panose="05000000000000000000" pitchFamily="2" charset="2"/>
+              <a:buChar char="ü"/>
+            </a:pPr>
+            <a:r>
+              <a:rPr lang="pt-BR" dirty="0">
+                <a:latin typeface="Arial" panose="020B0604020202020204" pitchFamily="34" charset="0"/>
+                <a:cs typeface="Arial" panose="020B0604020202020204" pitchFamily="34" charset="0"/>
+              </a:rPr>
+              <a:t>https://reactjs.org/docs/state-and-lifecycle.html</a:t>
+            </a:r>
+          </a:p>
+          <a:p>
+            <a:pPr>
+              <a:buFont typeface="Wingdings" panose="05000000000000000000" pitchFamily="2" charset="2"/>
+              <a:buChar char="ü"/>
+            </a:pPr>
+            <a:endParaRPr lang="pt-BR" dirty="0">
+              <a:latin typeface="Arial" panose="020B0604020202020204" pitchFamily="34" charset="0"/>
+              <a:cs typeface="Arial" panose="020B0604020202020204" pitchFamily="34" charset="0"/>
+            </a:endParaRPr>
+          </a:p>
+          <a:p>
+            <a:pPr>
+              <a:buFont typeface="Wingdings" panose="05000000000000000000" pitchFamily="2" charset="2"/>
+              <a:buChar char="ü"/>
+            </a:pPr>
+            <a:endParaRPr lang="pt-BR" dirty="0">
+              <a:latin typeface="Arial" panose="020B0604020202020204" pitchFamily="34" charset="0"/>
+              <a:cs typeface="Arial" panose="020B0604020202020204" pitchFamily="34" charset="0"/>
+            </a:endParaRPr>
+          </a:p>
+        </p:txBody>
+      </p:sp>
+      <p:sp>
+        <p:nvSpPr>
+          <p:cNvPr id="4" name="Título 1">
+            <a:extLst>
+              <a:ext uri="{FF2B5EF4-FFF2-40B4-BE49-F238E27FC236}">
+                <a16:creationId xmlns:a16="http://schemas.microsoft.com/office/drawing/2014/main" id="{34934F35-0906-4549-9909-B329B73EDBCA}"/>
+              </a:ext>
+            </a:extLst>
+          </p:cNvPr>
+          <p:cNvSpPr txBox="1">
+            <a:spLocks/>
+          </p:cNvSpPr>
+          <p:nvPr/>
+        </p:nvSpPr>
+        <p:spPr>
+          <a:xfrm>
+            <a:off x="0" y="122968"/>
+            <a:ext cx="12192000" cy="854430"/>
+          </a:xfrm>
+          <a:prstGeom prst="rect">
+            <a:avLst/>
+          </a:prstGeom>
+        </p:spPr>
+        <p:txBody>
+          <a:bodyPr vert="horz" lIns="91440" tIns="45720" rIns="91440" bIns="45720" rtlCol="0" anchor="ctr">
+            <a:noAutofit/>
+          </a:bodyPr>
+          <a:lstStyle>
+            <a:lvl1pPr algn="l" defTabSz="914400" rtl="0" eaLnBrk="1" latinLnBrk="0" hangingPunct="1">
+              <a:lnSpc>
+                <a:spcPct val="90000"/>
+              </a:lnSpc>
+              <a:spcBef>
+                <a:spcPct val="0"/>
+              </a:spcBef>
+              <a:buNone/>
+              <a:defRPr sz="4400" kern="1200">
+                <a:solidFill>
+                  <a:schemeClr val="tx1"/>
+                </a:solidFill>
+                <a:latin typeface="+mj-lt"/>
+                <a:ea typeface="+mj-ea"/>
+                <a:cs typeface="+mj-cs"/>
+              </a:defRPr>
+            </a:lvl1pPr>
+          </a:lstStyle>
+          <a:p>
+            <a:pPr algn="ctr"/>
+            <a:r>
+              <a:rPr lang="pt-BR" sz="5400" b="1" dirty="0">
+                <a:solidFill>
+                  <a:srgbClr val="F46524"/>
+                </a:solidFill>
+                <a:latin typeface="Arial" panose="020B0604020202020204" pitchFamily="34" charset="0"/>
+                <a:cs typeface="Arial" panose="020B0604020202020204" pitchFamily="34" charset="0"/>
+              </a:rPr>
+              <a:t>Referências	</a:t>
+            </a:r>
+          </a:p>
+        </p:txBody>
+      </p:sp>
+      <p:pic>
+        <p:nvPicPr>
+          <p:cNvPr id="5" name="Imagem 4">
+            <a:extLst>
+              <a:ext uri="{FF2B5EF4-FFF2-40B4-BE49-F238E27FC236}">
+                <a16:creationId xmlns:a16="http://schemas.microsoft.com/office/drawing/2014/main" id="{BD34B949-7911-4817-A780-4FD0E7942C08}"/>
+              </a:ext>
+            </a:extLst>
+          </p:cNvPr>
+          <p:cNvPicPr>
+            <a:picLocks noChangeAspect="1"/>
+          </p:cNvPicPr>
+          <p:nvPr/>
+        </p:nvPicPr>
+        <p:blipFill>
+          <a:blip r:embed="rId7"/>
+          <a:stretch>
+            <a:fillRect/>
+          </a:stretch>
+        </p:blipFill>
+        <p:spPr>
+          <a:xfrm>
+            <a:off x="10258887" y="122968"/>
+            <a:ext cx="1447800" cy="790575"/>
+          </a:xfrm>
+          <a:prstGeom prst="rect">
+            <a:avLst/>
+          </a:prstGeom>
+        </p:spPr>
+      </p:pic>
+      <p:pic>
+        <p:nvPicPr>
+          <p:cNvPr id="6" name="Imagem 5">
+            <a:extLst>
+              <a:ext uri="{FF2B5EF4-FFF2-40B4-BE49-F238E27FC236}">
+                <a16:creationId xmlns:a16="http://schemas.microsoft.com/office/drawing/2014/main" id="{AB37113D-8A5A-44BA-947B-C158178085B8}"/>
+              </a:ext>
+            </a:extLst>
+          </p:cNvPr>
+          <p:cNvPicPr>
+            <a:picLocks noChangeAspect="1"/>
+          </p:cNvPicPr>
+          <p:nvPr/>
+        </p:nvPicPr>
+        <p:blipFill>
+          <a:blip r:embed="rId8"/>
+          <a:stretch>
+            <a:fillRect/>
+          </a:stretch>
+        </p:blipFill>
+        <p:spPr>
+          <a:xfrm>
+            <a:off x="0" y="0"/>
+            <a:ext cx="1419225" cy="1495425"/>
+          </a:xfrm>
+          <a:prstGeom prst="rect">
+            <a:avLst/>
+          </a:prstGeom>
+        </p:spPr>
+      </p:pic>
+    </p:spTree>
+    <p:extLst>
+      <p:ext uri="{BB962C8B-B14F-4D97-AF65-F5344CB8AC3E}">
+        <p14:creationId xmlns:p14="http://schemas.microsoft.com/office/powerpoint/2010/main" val="2847445711"/>
+      </p:ext>
+    </p:extLst>
+  </p:cSld>
+  <p:clrMapOvr>
+    <a:masterClrMapping/>
+  </p:clrMapOvr>
 </p:sld>
 </file>
 

</xml_diff>